<commit_message>
preliminary map for poster presentation
</commit_message>
<xml_diff>
--- a/ForestAI-Poster-PPT.pptx
+++ b/ForestAI-Poster-PPT.pptx
@@ -1,19 +1,114 @@
 
 <file path=ppt/presentation.xml><?xml version="1.0" encoding="utf-8"?>
-<p:presentation xmlns:a="http://schemas.openxmlformats.org/drawingml/2006/main" xmlns:p="http://schemas.openxmlformats.org/presentationml/2006/main" xmlns:r="http://schemas.openxmlformats.org/officeDocument/2006/relationships" xmlns:p14="http://schemas.microsoft.com/office/powerpoint/2010/main" xmlns:p15="http://schemas.microsoft.com/office/powerpoint/2012/main" xmlns:mc="http://schemas.openxmlformats.org/markup-compatibility/2006">
+<p:presentation xmlns:a="http://schemas.openxmlformats.org/drawingml/2006/main" xmlns:r="http://schemas.openxmlformats.org/officeDocument/2006/relationships" xmlns:p="http://schemas.openxmlformats.org/presentationml/2006/main">
   <p:sldMasterIdLst>
-    <p:sldMasterId id="2147483648" r:id="rId2"/>
+    <p:sldMasterId id="2147483648" r:id="rId1"/>
   </p:sldMasterIdLst>
   <p:sldIdLst>
-    <p:sldId id="256" r:id="rId3"/>
+    <p:sldId id="256" r:id="rId2"/>
   </p:sldIdLst>
   <p:sldSz cx="21945600" cy="32918400"/>
   <p:notesSz cx="7772400" cy="10058400"/>
+  <p:defaultTextStyle>
+    <a:defPPr>
+      <a:defRPr lang="en-US"/>
+    </a:defPPr>
+    <a:lvl1pPr marL="0" algn="l" defTabSz="914400" rtl="0" eaLnBrk="1" latinLnBrk="0" hangingPunct="1">
+      <a:defRPr sz="1800" kern="1200">
+        <a:solidFill>
+          <a:schemeClr val="tx1"/>
+        </a:solidFill>
+        <a:latin typeface="+mn-lt"/>
+        <a:ea typeface="+mn-ea"/>
+        <a:cs typeface="+mn-cs"/>
+      </a:defRPr>
+    </a:lvl1pPr>
+    <a:lvl2pPr marL="457200" algn="l" defTabSz="914400" rtl="0" eaLnBrk="1" latinLnBrk="0" hangingPunct="1">
+      <a:defRPr sz="1800" kern="1200">
+        <a:solidFill>
+          <a:schemeClr val="tx1"/>
+        </a:solidFill>
+        <a:latin typeface="+mn-lt"/>
+        <a:ea typeface="+mn-ea"/>
+        <a:cs typeface="+mn-cs"/>
+      </a:defRPr>
+    </a:lvl2pPr>
+    <a:lvl3pPr marL="914400" algn="l" defTabSz="914400" rtl="0" eaLnBrk="1" latinLnBrk="0" hangingPunct="1">
+      <a:defRPr sz="1800" kern="1200">
+        <a:solidFill>
+          <a:schemeClr val="tx1"/>
+        </a:solidFill>
+        <a:latin typeface="+mn-lt"/>
+        <a:ea typeface="+mn-ea"/>
+        <a:cs typeface="+mn-cs"/>
+      </a:defRPr>
+    </a:lvl3pPr>
+    <a:lvl4pPr marL="1371600" algn="l" defTabSz="914400" rtl="0" eaLnBrk="1" latinLnBrk="0" hangingPunct="1">
+      <a:defRPr sz="1800" kern="1200">
+        <a:solidFill>
+          <a:schemeClr val="tx1"/>
+        </a:solidFill>
+        <a:latin typeface="+mn-lt"/>
+        <a:ea typeface="+mn-ea"/>
+        <a:cs typeface="+mn-cs"/>
+      </a:defRPr>
+    </a:lvl4pPr>
+    <a:lvl5pPr marL="1828800" algn="l" defTabSz="914400" rtl="0" eaLnBrk="1" latinLnBrk="0" hangingPunct="1">
+      <a:defRPr sz="1800" kern="1200">
+        <a:solidFill>
+          <a:schemeClr val="tx1"/>
+        </a:solidFill>
+        <a:latin typeface="+mn-lt"/>
+        <a:ea typeface="+mn-ea"/>
+        <a:cs typeface="+mn-cs"/>
+      </a:defRPr>
+    </a:lvl5pPr>
+    <a:lvl6pPr marL="2286000" algn="l" defTabSz="914400" rtl="0" eaLnBrk="1" latinLnBrk="0" hangingPunct="1">
+      <a:defRPr sz="1800" kern="1200">
+        <a:solidFill>
+          <a:schemeClr val="tx1"/>
+        </a:solidFill>
+        <a:latin typeface="+mn-lt"/>
+        <a:ea typeface="+mn-ea"/>
+        <a:cs typeface="+mn-cs"/>
+      </a:defRPr>
+    </a:lvl6pPr>
+    <a:lvl7pPr marL="2743200" algn="l" defTabSz="914400" rtl="0" eaLnBrk="1" latinLnBrk="0" hangingPunct="1">
+      <a:defRPr sz="1800" kern="1200">
+        <a:solidFill>
+          <a:schemeClr val="tx1"/>
+        </a:solidFill>
+        <a:latin typeface="+mn-lt"/>
+        <a:ea typeface="+mn-ea"/>
+        <a:cs typeface="+mn-cs"/>
+      </a:defRPr>
+    </a:lvl7pPr>
+    <a:lvl8pPr marL="3200400" algn="l" defTabSz="914400" rtl="0" eaLnBrk="1" latinLnBrk="0" hangingPunct="1">
+      <a:defRPr sz="1800" kern="1200">
+        <a:solidFill>
+          <a:schemeClr val="tx1"/>
+        </a:solidFill>
+        <a:latin typeface="+mn-lt"/>
+        <a:ea typeface="+mn-ea"/>
+        <a:cs typeface="+mn-cs"/>
+      </a:defRPr>
+    </a:lvl8pPr>
+    <a:lvl9pPr marL="3657600" algn="l" defTabSz="914400" rtl="0" eaLnBrk="1" latinLnBrk="0" hangingPunct="1">
+      <a:defRPr sz="1800" kern="1200">
+        <a:solidFill>
+          <a:schemeClr val="tx1"/>
+        </a:solidFill>
+        <a:latin typeface="+mn-lt"/>
+        <a:ea typeface="+mn-ea"/>
+        <a:cs typeface="+mn-cs"/>
+      </a:defRPr>
+    </a:lvl9pPr>
+  </p:defaultTextStyle>
 </p:presentation>
 </file>
 
 <file path=ppt/slideLayouts/slideLayout1.xml><?xml version="1.0" encoding="utf-8"?>
-<p:sldLayout xmlns:a="http://schemas.openxmlformats.org/drawingml/2006/main" xmlns:p="http://schemas.openxmlformats.org/presentationml/2006/main" xmlns:r="http://schemas.openxmlformats.org/officeDocument/2006/relationships" xmlns:p14="http://schemas.microsoft.com/office/powerpoint/2010/main" xmlns:p15="http://schemas.microsoft.com/office/powerpoint/2012/main" xmlns:mc="http://schemas.openxmlformats.org/markup-compatibility/2006" type="blank" preserve="1">
+<p:sldLayout xmlns:a="http://schemas.openxmlformats.org/drawingml/2006/main" xmlns:r="http://schemas.openxmlformats.org/officeDocument/2006/relationships" xmlns:p="http://schemas.openxmlformats.org/presentationml/2006/main" type="blank" preserve="1">
   <p:cSld name="Title Slide">
     <p:spTree>
       <p:nvGrpSpPr>
@@ -31,17 +126,21 @@
       </p:grpSpPr>
     </p:spTree>
   </p:cSld>
+  <p:clrMapOvr>
+    <a:masterClrMapping/>
+  </p:clrMapOvr>
 </p:sldLayout>
 </file>
 
 <file path=ppt/slideMasters/slideMaster1.xml><?xml version="1.0" encoding="utf-8"?>
-<p:sldMaster xmlns:a="http://schemas.openxmlformats.org/drawingml/2006/main" xmlns:p="http://schemas.openxmlformats.org/presentationml/2006/main" xmlns:r="http://schemas.openxmlformats.org/officeDocument/2006/relationships" xmlns:p14="http://schemas.microsoft.com/office/powerpoint/2010/main" xmlns:p15="http://schemas.microsoft.com/office/powerpoint/2012/main" xmlns:mc="http://schemas.openxmlformats.org/markup-compatibility/2006">
+<p:sldMaster xmlns:a="http://schemas.openxmlformats.org/drawingml/2006/main" xmlns:r="http://schemas.openxmlformats.org/officeDocument/2006/relationships" xmlns:p="http://schemas.openxmlformats.org/presentationml/2006/main">
   <p:cSld>
     <p:bg>
       <p:bgPr>
         <a:solidFill>
-          <a:srgbClr val="ffffff"/>
+          <a:srgbClr val="FFFFFF"/>
         </a:solidFill>
+        <a:effectLst/>
       </p:bgPr>
     </p:bg>
     <p:spTree>
@@ -60,12 +159,12 @@
       </p:grpSpPr>
       <p:pic>
         <p:nvPicPr>
-          <p:cNvPr id="0" name="Picture 1" descr="NRCan poster template_portrait_eng.jpg"/>
+          <p:cNvPr id="2" name="Picture 1" descr="NRCan poster template_portrait_eng.jpg"/>
           <p:cNvPicPr/>
           <p:nvPr/>
         </p:nvPicPr>
         <p:blipFill>
-          <a:blip r:embed="rId2"/>
+          <a:blip r:embed="rId3"/>
           <a:stretch/>
         </p:blipFill>
         <p:spPr>
@@ -86,13 +185,293 @@
   </p:cSld>
   <p:clrMap bg1="lt1" tx1="dk1" bg2="lt2" tx2="dk2" accent1="accent1" accent2="accent2" accent3="accent3" accent4="accent4" accent5="accent5" accent6="accent6" hlink="hlink" folHlink="folHlink"/>
   <p:sldLayoutIdLst>
-    <p:sldLayoutId id="2147483649" r:id="rId3"/>
+    <p:sldLayoutId id="2147483649" r:id="rId1"/>
   </p:sldLayoutIdLst>
+  <p:txStyles>
+    <p:titleStyle>
+      <a:lvl1pPr algn="l" defTabSz="914400" rtl="0" eaLnBrk="1" latinLnBrk="0" hangingPunct="1">
+        <a:lnSpc>
+          <a:spcPct val="90000"/>
+        </a:lnSpc>
+        <a:spcBef>
+          <a:spcPct val="0"/>
+        </a:spcBef>
+        <a:buNone/>
+        <a:defRPr sz="4400" kern="1200">
+          <a:solidFill>
+            <a:schemeClr val="tx1"/>
+          </a:solidFill>
+          <a:latin typeface="+mj-lt"/>
+          <a:ea typeface="+mj-ea"/>
+          <a:cs typeface="+mj-cs"/>
+        </a:defRPr>
+      </a:lvl1pPr>
+    </p:titleStyle>
+    <p:bodyStyle>
+      <a:lvl1pPr marL="228600" indent="-228600" algn="l" defTabSz="914400" rtl="0" eaLnBrk="1" latinLnBrk="0" hangingPunct="1">
+        <a:lnSpc>
+          <a:spcPct val="90000"/>
+        </a:lnSpc>
+        <a:spcBef>
+          <a:spcPts val="1000"/>
+        </a:spcBef>
+        <a:buFont typeface="Arial" panose="020B0604020202020204" pitchFamily="34" charset="0"/>
+        <a:buChar char="•"/>
+        <a:defRPr sz="2800" kern="1200">
+          <a:solidFill>
+            <a:schemeClr val="tx1"/>
+          </a:solidFill>
+          <a:latin typeface="+mn-lt"/>
+          <a:ea typeface="+mn-ea"/>
+          <a:cs typeface="+mn-cs"/>
+        </a:defRPr>
+      </a:lvl1pPr>
+      <a:lvl2pPr marL="685800" indent="-228600" algn="l" defTabSz="914400" rtl="0" eaLnBrk="1" latinLnBrk="0" hangingPunct="1">
+        <a:lnSpc>
+          <a:spcPct val="90000"/>
+        </a:lnSpc>
+        <a:spcBef>
+          <a:spcPts val="500"/>
+        </a:spcBef>
+        <a:buFont typeface="Arial" panose="020B0604020202020204" pitchFamily="34" charset="0"/>
+        <a:buChar char="•"/>
+        <a:defRPr sz="2400" kern="1200">
+          <a:solidFill>
+            <a:schemeClr val="tx1"/>
+          </a:solidFill>
+          <a:latin typeface="+mn-lt"/>
+          <a:ea typeface="+mn-ea"/>
+          <a:cs typeface="+mn-cs"/>
+        </a:defRPr>
+      </a:lvl2pPr>
+      <a:lvl3pPr marL="1143000" indent="-228600" algn="l" defTabSz="914400" rtl="0" eaLnBrk="1" latinLnBrk="0" hangingPunct="1">
+        <a:lnSpc>
+          <a:spcPct val="90000"/>
+        </a:lnSpc>
+        <a:spcBef>
+          <a:spcPts val="500"/>
+        </a:spcBef>
+        <a:buFont typeface="Arial" panose="020B0604020202020204" pitchFamily="34" charset="0"/>
+        <a:buChar char="•"/>
+        <a:defRPr sz="2000" kern="1200">
+          <a:solidFill>
+            <a:schemeClr val="tx1"/>
+          </a:solidFill>
+          <a:latin typeface="+mn-lt"/>
+          <a:ea typeface="+mn-ea"/>
+          <a:cs typeface="+mn-cs"/>
+        </a:defRPr>
+      </a:lvl3pPr>
+      <a:lvl4pPr marL="1600200" indent="-228600" algn="l" defTabSz="914400" rtl="0" eaLnBrk="1" latinLnBrk="0" hangingPunct="1">
+        <a:lnSpc>
+          <a:spcPct val="90000"/>
+        </a:lnSpc>
+        <a:spcBef>
+          <a:spcPts val="500"/>
+        </a:spcBef>
+        <a:buFont typeface="Arial" panose="020B0604020202020204" pitchFamily="34" charset="0"/>
+        <a:buChar char="•"/>
+        <a:defRPr sz="1800" kern="1200">
+          <a:solidFill>
+            <a:schemeClr val="tx1"/>
+          </a:solidFill>
+          <a:latin typeface="+mn-lt"/>
+          <a:ea typeface="+mn-ea"/>
+          <a:cs typeface="+mn-cs"/>
+        </a:defRPr>
+      </a:lvl4pPr>
+      <a:lvl5pPr marL="2057400" indent="-228600" algn="l" defTabSz="914400" rtl="0" eaLnBrk="1" latinLnBrk="0" hangingPunct="1">
+        <a:lnSpc>
+          <a:spcPct val="90000"/>
+        </a:lnSpc>
+        <a:spcBef>
+          <a:spcPts val="500"/>
+        </a:spcBef>
+        <a:buFont typeface="Arial" panose="020B0604020202020204" pitchFamily="34" charset="0"/>
+        <a:buChar char="•"/>
+        <a:defRPr sz="1800" kern="1200">
+          <a:solidFill>
+            <a:schemeClr val="tx1"/>
+          </a:solidFill>
+          <a:latin typeface="+mn-lt"/>
+          <a:ea typeface="+mn-ea"/>
+          <a:cs typeface="+mn-cs"/>
+        </a:defRPr>
+      </a:lvl5pPr>
+      <a:lvl6pPr marL="2514600" indent="-228600" algn="l" defTabSz="914400" rtl="0" eaLnBrk="1" latinLnBrk="0" hangingPunct="1">
+        <a:lnSpc>
+          <a:spcPct val="90000"/>
+        </a:lnSpc>
+        <a:spcBef>
+          <a:spcPts val="500"/>
+        </a:spcBef>
+        <a:buFont typeface="Arial" panose="020B0604020202020204" pitchFamily="34" charset="0"/>
+        <a:buChar char="•"/>
+        <a:defRPr sz="1800" kern="1200">
+          <a:solidFill>
+            <a:schemeClr val="tx1"/>
+          </a:solidFill>
+          <a:latin typeface="+mn-lt"/>
+          <a:ea typeface="+mn-ea"/>
+          <a:cs typeface="+mn-cs"/>
+        </a:defRPr>
+      </a:lvl6pPr>
+      <a:lvl7pPr marL="2971800" indent="-228600" algn="l" defTabSz="914400" rtl="0" eaLnBrk="1" latinLnBrk="0" hangingPunct="1">
+        <a:lnSpc>
+          <a:spcPct val="90000"/>
+        </a:lnSpc>
+        <a:spcBef>
+          <a:spcPts val="500"/>
+        </a:spcBef>
+        <a:buFont typeface="Arial" panose="020B0604020202020204" pitchFamily="34" charset="0"/>
+        <a:buChar char="•"/>
+        <a:defRPr sz="1800" kern="1200">
+          <a:solidFill>
+            <a:schemeClr val="tx1"/>
+          </a:solidFill>
+          <a:latin typeface="+mn-lt"/>
+          <a:ea typeface="+mn-ea"/>
+          <a:cs typeface="+mn-cs"/>
+        </a:defRPr>
+      </a:lvl7pPr>
+      <a:lvl8pPr marL="3429000" indent="-228600" algn="l" defTabSz="914400" rtl="0" eaLnBrk="1" latinLnBrk="0" hangingPunct="1">
+        <a:lnSpc>
+          <a:spcPct val="90000"/>
+        </a:lnSpc>
+        <a:spcBef>
+          <a:spcPts val="500"/>
+        </a:spcBef>
+        <a:buFont typeface="Arial" panose="020B0604020202020204" pitchFamily="34" charset="0"/>
+        <a:buChar char="•"/>
+        <a:defRPr sz="1800" kern="1200">
+          <a:solidFill>
+            <a:schemeClr val="tx1"/>
+          </a:solidFill>
+          <a:latin typeface="+mn-lt"/>
+          <a:ea typeface="+mn-ea"/>
+          <a:cs typeface="+mn-cs"/>
+        </a:defRPr>
+      </a:lvl8pPr>
+      <a:lvl9pPr marL="3886200" indent="-228600" algn="l" defTabSz="914400" rtl="0" eaLnBrk="1" latinLnBrk="0" hangingPunct="1">
+        <a:lnSpc>
+          <a:spcPct val="90000"/>
+        </a:lnSpc>
+        <a:spcBef>
+          <a:spcPts val="500"/>
+        </a:spcBef>
+        <a:buFont typeface="Arial" panose="020B0604020202020204" pitchFamily="34" charset="0"/>
+        <a:buChar char="•"/>
+        <a:defRPr sz="1800" kern="1200">
+          <a:solidFill>
+            <a:schemeClr val="tx1"/>
+          </a:solidFill>
+          <a:latin typeface="+mn-lt"/>
+          <a:ea typeface="+mn-ea"/>
+          <a:cs typeface="+mn-cs"/>
+        </a:defRPr>
+      </a:lvl9pPr>
+    </p:bodyStyle>
+    <p:otherStyle>
+      <a:defPPr>
+        <a:defRPr lang="en-US"/>
+      </a:defPPr>
+      <a:lvl1pPr marL="0" algn="l" defTabSz="914400" rtl="0" eaLnBrk="1" latinLnBrk="0" hangingPunct="1">
+        <a:defRPr sz="1800" kern="1200">
+          <a:solidFill>
+            <a:schemeClr val="tx1"/>
+          </a:solidFill>
+          <a:latin typeface="+mn-lt"/>
+          <a:ea typeface="+mn-ea"/>
+          <a:cs typeface="+mn-cs"/>
+        </a:defRPr>
+      </a:lvl1pPr>
+      <a:lvl2pPr marL="457200" algn="l" defTabSz="914400" rtl="0" eaLnBrk="1" latinLnBrk="0" hangingPunct="1">
+        <a:defRPr sz="1800" kern="1200">
+          <a:solidFill>
+            <a:schemeClr val="tx1"/>
+          </a:solidFill>
+          <a:latin typeface="+mn-lt"/>
+          <a:ea typeface="+mn-ea"/>
+          <a:cs typeface="+mn-cs"/>
+        </a:defRPr>
+      </a:lvl2pPr>
+      <a:lvl3pPr marL="914400" algn="l" defTabSz="914400" rtl="0" eaLnBrk="1" latinLnBrk="0" hangingPunct="1">
+        <a:defRPr sz="1800" kern="1200">
+          <a:solidFill>
+            <a:schemeClr val="tx1"/>
+          </a:solidFill>
+          <a:latin typeface="+mn-lt"/>
+          <a:ea typeface="+mn-ea"/>
+          <a:cs typeface="+mn-cs"/>
+        </a:defRPr>
+      </a:lvl3pPr>
+      <a:lvl4pPr marL="1371600" algn="l" defTabSz="914400" rtl="0" eaLnBrk="1" latinLnBrk="0" hangingPunct="1">
+        <a:defRPr sz="1800" kern="1200">
+          <a:solidFill>
+            <a:schemeClr val="tx1"/>
+          </a:solidFill>
+          <a:latin typeface="+mn-lt"/>
+          <a:ea typeface="+mn-ea"/>
+          <a:cs typeface="+mn-cs"/>
+        </a:defRPr>
+      </a:lvl4pPr>
+      <a:lvl5pPr marL="1828800" algn="l" defTabSz="914400" rtl="0" eaLnBrk="1" latinLnBrk="0" hangingPunct="1">
+        <a:defRPr sz="1800" kern="1200">
+          <a:solidFill>
+            <a:schemeClr val="tx1"/>
+          </a:solidFill>
+          <a:latin typeface="+mn-lt"/>
+          <a:ea typeface="+mn-ea"/>
+          <a:cs typeface="+mn-cs"/>
+        </a:defRPr>
+      </a:lvl5pPr>
+      <a:lvl6pPr marL="2286000" algn="l" defTabSz="914400" rtl="0" eaLnBrk="1" latinLnBrk="0" hangingPunct="1">
+        <a:defRPr sz="1800" kern="1200">
+          <a:solidFill>
+            <a:schemeClr val="tx1"/>
+          </a:solidFill>
+          <a:latin typeface="+mn-lt"/>
+          <a:ea typeface="+mn-ea"/>
+          <a:cs typeface="+mn-cs"/>
+        </a:defRPr>
+      </a:lvl6pPr>
+      <a:lvl7pPr marL="2743200" algn="l" defTabSz="914400" rtl="0" eaLnBrk="1" latinLnBrk="0" hangingPunct="1">
+        <a:defRPr sz="1800" kern="1200">
+          <a:solidFill>
+            <a:schemeClr val="tx1"/>
+          </a:solidFill>
+          <a:latin typeface="+mn-lt"/>
+          <a:ea typeface="+mn-ea"/>
+          <a:cs typeface="+mn-cs"/>
+        </a:defRPr>
+      </a:lvl7pPr>
+      <a:lvl8pPr marL="3200400" algn="l" defTabSz="914400" rtl="0" eaLnBrk="1" latinLnBrk="0" hangingPunct="1">
+        <a:defRPr sz="1800" kern="1200">
+          <a:solidFill>
+            <a:schemeClr val="tx1"/>
+          </a:solidFill>
+          <a:latin typeface="+mn-lt"/>
+          <a:ea typeface="+mn-ea"/>
+          <a:cs typeface="+mn-cs"/>
+        </a:defRPr>
+      </a:lvl8pPr>
+      <a:lvl9pPr marL="3657600" algn="l" defTabSz="914400" rtl="0" eaLnBrk="1" latinLnBrk="0" hangingPunct="1">
+        <a:defRPr sz="1800" kern="1200">
+          <a:solidFill>
+            <a:schemeClr val="tx1"/>
+          </a:solidFill>
+          <a:latin typeface="+mn-lt"/>
+          <a:ea typeface="+mn-ea"/>
+          <a:cs typeface="+mn-cs"/>
+        </a:defRPr>
+      </a:lvl9pPr>
+    </p:otherStyle>
+  </p:txStyles>
 </p:sldMaster>
 </file>
 
 <file path=ppt/slides/slide1.xml><?xml version="1.0" encoding="utf-8"?>
-<p:sld xmlns:a="http://schemas.openxmlformats.org/drawingml/2006/main" xmlns:p="http://schemas.openxmlformats.org/presentationml/2006/main" xmlns:r="http://schemas.openxmlformats.org/officeDocument/2006/relationships" xmlns:p14="http://schemas.microsoft.com/office/powerpoint/2010/main" xmlns:p15="http://schemas.microsoft.com/office/powerpoint/2012/main" xmlns:mc="http://schemas.openxmlformats.org/markup-compatibility/2006">
+<p:sld xmlns:a="http://schemas.openxmlformats.org/drawingml/2006/main" xmlns:r="http://schemas.openxmlformats.org/officeDocument/2006/relationships" xmlns:p="http://schemas.openxmlformats.org/presentationml/2006/main">
   <p:cSld>
     <p:spTree>
       <p:nvGrpSpPr>
@@ -110,7 +489,7 @@
       </p:grpSpPr>
       <p:sp>
         <p:nvSpPr>
-          <p:cNvPr id="1" name="PlaceHolder 1"/>
+          <p:cNvPr id="16" name="PlaceHolder 1"/>
           <p:cNvSpPr>
             <a:spLocks noGrp="1"/>
           </p:cNvSpPr>
@@ -137,9 +516,10 @@
           </a:ln>
         </p:spPr>
         <p:txBody>
-          <a:bodyPr lIns="313560" rIns="313560" tIns="156600" bIns="156600" anchor="ctr">
+          <a:bodyPr lIns="313560" tIns="156600" rIns="313560" bIns="156600" anchor="ctr">
             <a:normAutofit/>
           </a:bodyPr>
+          <a:lstStyle/>
           <a:p>
             <a:pPr indent="0" algn="ctr" defTabSz="1567440">
               <a:lnSpc>
@@ -148,7 +528,7 @@
               <a:buNone/>
             </a:pPr>
             <a:r>
-              <a:rPr b="1" lang="en-CA" sz="6700" strike="noStrike" u="none">
+              <a:rPr lang="en-CA" sz="6700" b="1" u="none" strike="noStrike">
                 <a:solidFill>
                   <a:schemeClr val="dk1"/>
                 </a:solidFill>
@@ -158,7 +538,7 @@
               </a:rPr>
               <a:t>ForestAI: An AI-Powered Platform for Enhanced Forest Resource Assessment and Health Monitoring</a:t>
             </a:r>
-            <a:endParaRPr b="0" lang="en-US" sz="6700" strike="noStrike" u="none">
+            <a:endParaRPr lang="en-US" sz="6700" b="0" u="none" strike="noStrike">
               <a:solidFill>
                 <a:schemeClr val="dk1"/>
               </a:solidFill>
@@ -193,15 +573,22 @@
           </a:ln>
         </p:spPr>
         <p:style>
-          <a:lnRef idx="0"/>
-          <a:fillRef idx="0"/>
-          <a:effectRef idx="0"/>
+          <a:lnRef idx="0">
+            <a:scrgbClr r="0" g="0" b="0"/>
+          </a:lnRef>
+          <a:fillRef idx="0">
+            <a:scrgbClr r="0" g="0" b="0"/>
+          </a:fillRef>
+          <a:effectRef idx="0">
+            <a:scrgbClr r="0" g="0" b="0"/>
+          </a:effectRef>
           <a:fontRef idx="minor"/>
         </p:style>
         <p:txBody>
-          <a:bodyPr lIns="90000" rIns="90000" tIns="45000" bIns="45000" anchor="t">
+          <a:bodyPr lIns="90000" tIns="45000" rIns="90000" bIns="45000" anchor="t">
             <a:spAutoFit/>
           </a:bodyPr>
+          <a:lstStyle/>
           <a:p>
             <a:pPr>
               <a:lnSpc>
@@ -209,7 +596,7 @@
               </a:lnSpc>
             </a:pPr>
             <a:r>
-              <a:rPr b="1" lang="en-CA" sz="3600" strike="noStrike" u="none">
+              <a:rPr lang="en-CA" sz="3600" b="1" u="none" strike="noStrike">
                 <a:solidFill>
                   <a:schemeClr val="lt1"/>
                 </a:solidFill>
@@ -220,7 +607,7 @@
               <a:t>Ping Yang</a:t>
             </a:r>
             <a:r>
-              <a:rPr b="1" lang="en-CA" sz="3600" strike="noStrike" u="none" baseline="30000">
+              <a:rPr lang="en-CA" sz="3600" b="1" u="none" strike="noStrike" baseline="30000">
                 <a:solidFill>
                   <a:schemeClr val="lt1"/>
                 </a:solidFill>
@@ -232,7 +619,7 @@
               <a:t>1</a:t>
             </a:r>
             <a:r>
-              <a:rPr b="1" lang="en-CA" sz="4000" strike="noStrike" u="none">
+              <a:rPr lang="en-CA" sz="4000" b="1" u="none" strike="noStrike">
                 <a:solidFill>
                   <a:schemeClr val="lt1"/>
                 </a:solidFill>
@@ -244,7 +631,7 @@
               <a:t>, </a:t>
             </a:r>
             <a:r>
-              <a:rPr b="1" lang="en-CA" sz="3600" strike="noStrike" u="none">
+              <a:rPr lang="en-CA" sz="3600" b="1" u="none" strike="noStrike">
                 <a:solidFill>
                   <a:schemeClr val="lt1"/>
                 </a:solidFill>
@@ -256,7 +643,7 @@
               <a:t>Chen Ding </a:t>
             </a:r>
             <a:r>
-              <a:rPr b="1" lang="en-CA" sz="3600" strike="noStrike" u="none" baseline="30000">
+              <a:rPr lang="en-CA" sz="3600" b="1" u="none" strike="noStrike" baseline="30000">
                 <a:solidFill>
                   <a:schemeClr val="lt1"/>
                 </a:solidFill>
@@ -268,7 +655,7 @@
               <a:t>2,5</a:t>
             </a:r>
             <a:r>
-              <a:rPr b="1" lang="en-CA" sz="3600" strike="noStrike" u="none">
+              <a:rPr lang="en-CA" sz="3600" b="1" u="none" strike="noStrike">
                 <a:solidFill>
                   <a:schemeClr val="lt1"/>
                 </a:solidFill>
@@ -280,7 +667,7 @@
               <a:t>*, Yan LI </a:t>
             </a:r>
             <a:r>
-              <a:rPr b="1" lang="en-CA" sz="3600" strike="noStrike" u="none" baseline="30000">
+              <a:rPr lang="en-CA" sz="3600" b="1" u="none" strike="noStrike" baseline="30000">
                 <a:solidFill>
                   <a:schemeClr val="lt1"/>
                 </a:solidFill>
@@ -292,7 +679,7 @@
               <a:t>3</a:t>
             </a:r>
             <a:r>
-              <a:rPr b="1" lang="en-CA" sz="3600" strike="noStrike" u="none">
+              <a:rPr lang="en-CA" sz="3600" b="1" u="none" strike="noStrike">
                 <a:solidFill>
                   <a:schemeClr val="lt1"/>
                 </a:solidFill>
@@ -304,7 +691,7 @@
               <a:t>, Hao Chen </a:t>
             </a:r>
             <a:r>
-              <a:rPr b="1" lang="en-CA" sz="3600" strike="noStrike" u="none" baseline="30000">
+              <a:rPr lang="en-CA" sz="3600" b="1" u="none" strike="noStrike" baseline="30000">
                 <a:solidFill>
                   <a:schemeClr val="lt1"/>
                 </a:solidFill>
@@ -316,7 +703,7 @@
               <a:t>2</a:t>
             </a:r>
             <a:r>
-              <a:rPr b="1" lang="en-CA" sz="3600" strike="noStrike" u="none">
+              <a:rPr lang="en-CA" sz="3600" b="1" u="none" strike="noStrike">
                 <a:solidFill>
                   <a:schemeClr val="lt1"/>
                 </a:solidFill>
@@ -328,7 +715,7 @@
               <a:t>, Lana Narine</a:t>
             </a:r>
             <a:r>
-              <a:rPr b="1" lang="en-CA" sz="3600" strike="noStrike" u="none" baseline="30000">
+              <a:rPr lang="en-CA" sz="3600" b="1" u="none" strike="noStrike" baseline="30000">
                 <a:solidFill>
                   <a:schemeClr val="lt1"/>
                 </a:solidFill>
@@ -340,7 +727,7 @@
               <a:t>2</a:t>
             </a:r>
             <a:r>
-              <a:rPr b="1" lang="en-CA" sz="3600" strike="noStrike" u="none">
+              <a:rPr lang="en-CA" sz="3600" b="1" u="none" strike="noStrike">
                 <a:solidFill>
                   <a:schemeClr val="lt1"/>
                 </a:solidFill>
@@ -352,7 +739,7 @@
               <a:t>, Richard Cristan</a:t>
             </a:r>
             <a:r>
-              <a:rPr b="1" lang="en-CA" sz="3600" strike="noStrike" u="none" baseline="30000">
+              <a:rPr lang="en-CA" sz="3600" b="1" u="none" strike="noStrike" baseline="30000">
                 <a:solidFill>
                   <a:schemeClr val="lt1"/>
                 </a:solidFill>
@@ -364,7 +751,7 @@
               <a:t>2</a:t>
             </a:r>
             <a:r>
-              <a:rPr b="1" lang="en-CA" sz="3600" strike="noStrike" u="none">
+              <a:rPr lang="en-CA" sz="3600" b="1" u="none" strike="noStrike">
                 <a:solidFill>
                   <a:schemeClr val="lt1"/>
                 </a:solidFill>
@@ -376,7 +763,7 @@
               <a:t>, Yuede JI </a:t>
             </a:r>
             <a:r>
-              <a:rPr b="1" lang="en-CA" sz="3600" strike="noStrike" u="none" baseline="30000">
+              <a:rPr lang="en-CA" sz="3600" b="1" u="none" strike="noStrike" baseline="30000">
                 <a:solidFill>
                   <a:schemeClr val="lt1"/>
                 </a:solidFill>
@@ -391,7 +778,7 @@
               <a:rPr sz="4000"/>
             </a:br>
             <a:r>
-              <a:rPr b="0" lang="en-CA" sz="3200" strike="noStrike" u="none" baseline="30000">
+              <a:rPr lang="en-CA" sz="3200" b="0" u="none" strike="noStrike" baseline="30000">
                 <a:solidFill>
                   <a:schemeClr val="lt1"/>
                 </a:solidFill>
@@ -403,7 +790,7 @@
               <a:t>1</a:t>
             </a:r>
             <a:r>
-              <a:rPr b="0" lang="en-CA" sz="3200" strike="noStrike" u="none">
+              <a:rPr lang="en-CA" sz="3200" b="0" u="none" strike="noStrike">
                 <a:solidFill>
                   <a:schemeClr val="lt1"/>
                 </a:solidFill>
@@ -414,9 +801,9 @@
               </a:rPr>
               <a:t>Dynamic Pacific LLC., Round Rock, TX;</a:t>
             </a:r>
-            <a:endParaRPr b="0" lang="en-US" sz="3200" strike="noStrike" u="none">
+            <a:endParaRPr lang="en-US" sz="3200" b="0" u="none" strike="noStrike">
               <a:solidFill>
-                <a:srgbClr val="ffffff"/>
+                <a:srgbClr val="FFFFFF"/>
               </a:solidFill>
               <a:effectLst/>
               <a:uFillTx/>
@@ -430,7 +817,7 @@
               </a:lnSpc>
             </a:pPr>
             <a:r>
-              <a:rPr b="0" lang="en-CA" sz="3200" strike="noStrike" u="none" baseline="30000">
+              <a:rPr lang="en-CA" sz="3200" b="0" u="none" strike="noStrike" baseline="30000">
                 <a:solidFill>
                   <a:schemeClr val="lt1"/>
                 </a:solidFill>
@@ -442,7 +829,7 @@
               <a:t>2</a:t>
             </a:r>
             <a:r>
-              <a:rPr b="0" lang="en-CA" sz="3200" strike="noStrike" u="none">
+              <a:rPr lang="en-CA" sz="3200" b="0" u="none" strike="noStrike">
                 <a:solidFill>
                   <a:schemeClr val="lt1"/>
                 </a:solidFill>
@@ -453,9 +840,9 @@
               </a:rPr>
               <a:t>College of Forestry, Department of Wildlife and the Environment, Auburn University, AL;</a:t>
             </a:r>
-            <a:endParaRPr b="0" lang="en-US" sz="3200" strike="noStrike" u="none">
+            <a:endParaRPr lang="en-US" sz="3200" b="0" u="none" strike="noStrike">
               <a:solidFill>
-                <a:srgbClr val="ffffff"/>
+                <a:srgbClr val="FFFFFF"/>
               </a:solidFill>
               <a:effectLst/>
               <a:uFillTx/>
@@ -469,7 +856,7 @@
               </a:lnSpc>
             </a:pPr>
             <a:r>
-              <a:rPr b="0" lang="en-CA" sz="3200" strike="noStrike" u="none" baseline="30000">
+              <a:rPr lang="en-CA" sz="3200" b="0" u="none" strike="noStrike" baseline="30000">
                 <a:solidFill>
                   <a:schemeClr val="lt1"/>
                 </a:solidFill>
@@ -481,7 +868,7 @@
               <a:t>3</a:t>
             </a:r>
             <a:r>
-              <a:rPr b="0" lang="en-CA" sz="3200" strike="noStrike" u="none">
+              <a:rPr lang="en-CA" sz="3200" b="0" u="none" strike="noStrike">
                 <a:solidFill>
                   <a:schemeClr val="lt1"/>
                 </a:solidFill>
@@ -492,9 +879,9 @@
               </a:rPr>
               <a:t>Department of Mechanical Aerospace and Biomedical Engineering, University of Tennessee, Konxville, TN;</a:t>
             </a:r>
-            <a:endParaRPr b="0" lang="en-US" sz="3200" strike="noStrike" u="none">
+            <a:endParaRPr lang="en-US" sz="3200" b="0" u="none" strike="noStrike">
               <a:solidFill>
-                <a:srgbClr val="ffffff"/>
+                <a:srgbClr val="FFFFFF"/>
               </a:solidFill>
               <a:effectLst/>
               <a:uFillTx/>
@@ -508,7 +895,7 @@
               </a:lnSpc>
             </a:pPr>
             <a:r>
-              <a:rPr b="0" lang="en-CA" sz="3200" strike="noStrike" u="none" baseline="30000">
+              <a:rPr lang="en-CA" sz="3200" b="0" u="none" strike="noStrike" baseline="30000">
                 <a:solidFill>
                   <a:schemeClr val="lt1"/>
                 </a:solidFill>
@@ -520,7 +907,7 @@
               <a:t>4</a:t>
             </a:r>
             <a:r>
-              <a:rPr b="0" lang="en-CA" sz="3200" strike="noStrike" u="none">
+              <a:rPr lang="en-CA" sz="3200" b="0" u="none" strike="noStrike">
                 <a:solidFill>
                   <a:schemeClr val="lt1"/>
                 </a:solidFill>
@@ -531,9 +918,9 @@
               </a:rPr>
               <a:t>Department of Computer Science and Engineering, the University of Texas at Arlington, TX</a:t>
             </a:r>
-            <a:endParaRPr b="0" lang="en-US" sz="3200" strike="noStrike" u="none">
+            <a:endParaRPr lang="en-US" sz="3200" b="0" u="none" strike="noStrike">
               <a:solidFill>
-                <a:srgbClr val="ffffff"/>
+                <a:srgbClr val="FFFFFF"/>
               </a:solidFill>
               <a:effectLst/>
               <a:uFillTx/>
@@ -542,7 +929,7 @@
           </a:p>
           <a:p>
             <a:r>
-              <a:rPr b="0" lang="en-CA" sz="3200" strike="noStrike" u="none" baseline="30000">
+              <a:rPr lang="en-CA" sz="3200" b="0" u="none" strike="noStrike" baseline="30000">
                 <a:solidFill>
                   <a:schemeClr val="lt1"/>
                 </a:solidFill>
@@ -554,7 +941,7 @@
               <a:t>5</a:t>
             </a:r>
             <a:r>
-              <a:rPr b="0" lang="en-CA" sz="3200" strike="noStrike" u="none">
+              <a:rPr lang="en-CA" sz="3200" b="0" u="none" strike="noStrike">
                 <a:solidFill>
                   <a:schemeClr val="lt1"/>
                 </a:solidFill>
@@ -565,9 +952,9 @@
               </a:rPr>
               <a:t>The Department of Statistics, Texas A&amp;M University, College Station, TX</a:t>
             </a:r>
-            <a:endParaRPr b="0" lang="en-US" sz="3200" strike="noStrike" u="none">
+            <a:endParaRPr lang="en-US" sz="3200" b="0" u="none" strike="noStrike">
               <a:solidFill>
-                <a:srgbClr val="ffffff"/>
+                <a:srgbClr val="FFFFFF"/>
               </a:solidFill>
               <a:effectLst/>
               <a:uFillTx/>
@@ -593,20 +980,27 @@
           <a:noFill/>
           <a:ln w="0">
             <a:solidFill>
-              <a:srgbClr val="4f81bd"/>
+              <a:srgbClr val="4F81BD"/>
             </a:solidFill>
           </a:ln>
         </p:spPr>
         <p:style>
-          <a:lnRef idx="0"/>
-          <a:fillRef idx="0"/>
-          <a:effectRef idx="0"/>
+          <a:lnRef idx="0">
+            <a:scrgbClr r="0" g="0" b="0"/>
+          </a:lnRef>
+          <a:fillRef idx="0">
+            <a:scrgbClr r="0" g="0" b="0"/>
+          </a:fillRef>
+          <a:effectRef idx="0">
+            <a:scrgbClr r="0" g="0" b="0"/>
+          </a:effectRef>
           <a:fontRef idx="minor"/>
         </p:style>
         <p:txBody>
-          <a:bodyPr lIns="90000" rIns="90000" tIns="45000" bIns="45000" anchor="t">
+          <a:bodyPr lIns="90000" tIns="45000" rIns="90000" bIns="45000" anchor="t">
             <a:spAutoFit/>
           </a:bodyPr>
+          <a:lstStyle/>
           <a:p>
             <a:pPr defTabSz="1567440">
               <a:lnSpc>
@@ -614,9 +1008,9 @@
               </a:lnSpc>
             </a:pPr>
             <a:r>
-              <a:rPr b="1" i="1" lang="en-US" sz="3600" strike="noStrike" u="none">
-                <a:solidFill>
-                  <a:srgbClr val="0000cc"/>
+              <a:rPr lang="en-US" sz="3600" b="1" i="1" u="none" strike="noStrike">
+                <a:solidFill>
+                  <a:srgbClr val="0000CC"/>
                 </a:solidFill>
                 <a:effectLst/>
                 <a:uFillTx/>
@@ -624,7 +1018,7 @@
               </a:rPr>
               <a:t>Abstract</a:t>
             </a:r>
-            <a:endParaRPr b="0" lang="en-US" sz="3600" strike="noStrike" u="none">
+            <a:endParaRPr lang="en-US" sz="3600" b="0" u="none" strike="noStrike">
               <a:solidFill>
                 <a:srgbClr val="000000"/>
               </a:solidFill>
@@ -635,7 +1029,7 @@
           </a:p>
           <a:p>
             <a:r>
-              <a:rPr b="0" lang="en-CA" sz="2800" strike="noStrike" u="none">
+              <a:rPr lang="en-CA" sz="2800" b="0" u="none" strike="noStrike">
                 <a:solidFill>
                   <a:schemeClr val="dk1"/>
                 </a:solidFill>
@@ -646,9 +1040,9 @@
               <a:t>In</a:t>
             </a:r>
             <a:r>
-              <a:rPr b="0" lang="en-CA" sz="1300" strike="noStrike" u="none">
-                <a:solidFill>
-                  <a:srgbClr val="1a1a1a"/>
+              <a:rPr lang="en-CA" sz="1300" b="0" u="none" strike="noStrike">
+                <a:solidFill>
+                  <a:srgbClr val="1A1A1A"/>
                 </a:solidFill>
                 <a:effectLst/>
                 <a:uFillTx/>
@@ -658,7 +1052,7 @@
               <a:t> </a:t>
             </a:r>
             <a:r>
-              <a:rPr b="0" lang="en-CA" sz="2800" strike="noStrike" u="none">
+              <a:rPr lang="en-CA" sz="2800" b="0" u="none" strike="noStrike">
                 <a:solidFill>
                   <a:schemeClr val="dk1"/>
                 </a:solidFill>
@@ -668,7 +1062,7 @@
               </a:rPr>
               <a:t>the southeastern United States, known as the wood basket of the nation, 70% of U.S. reforestation occurs, producing over 25% of the world's pulpwood and 18% of its saw timber, so advanced forest monitoring tools are increasingly critical in this region. To address this need, we developed ForestAI, a web-based platform leveraging artificial intelligence to enhance automated assessment,  monitoring and projection of forest resources and health conditions.  </a:t>
             </a:r>
-            <a:endParaRPr b="0" lang="en-US" sz="2800" strike="noStrike" u="none">
+            <a:endParaRPr lang="en-US" sz="2800" b="0" u="none" strike="noStrike">
               <a:solidFill>
                 <a:srgbClr val="000000"/>
               </a:solidFill>
@@ -696,20 +1090,27 @@
           <a:noFill/>
           <a:ln w="0">
             <a:solidFill>
-              <a:srgbClr val="4f81bd"/>
+              <a:srgbClr val="4F81BD"/>
             </a:solidFill>
           </a:ln>
         </p:spPr>
         <p:style>
-          <a:lnRef idx="0"/>
-          <a:fillRef idx="0"/>
-          <a:effectRef idx="0"/>
+          <a:lnRef idx="0">
+            <a:scrgbClr r="0" g="0" b="0"/>
+          </a:lnRef>
+          <a:fillRef idx="0">
+            <a:scrgbClr r="0" g="0" b="0"/>
+          </a:fillRef>
+          <a:effectRef idx="0">
+            <a:scrgbClr r="0" g="0" b="0"/>
+          </a:effectRef>
           <a:fontRef idx="minor"/>
         </p:style>
         <p:txBody>
-          <a:bodyPr lIns="90000" rIns="90000" tIns="45000" bIns="45000" anchor="t">
+          <a:bodyPr lIns="90000" tIns="45000" rIns="90000" bIns="45000" anchor="t">
             <a:spAutoFit/>
           </a:bodyPr>
+          <a:lstStyle/>
           <a:p>
             <a:pPr defTabSz="1567440">
               <a:lnSpc>
@@ -717,9 +1118,9 @@
               </a:lnSpc>
             </a:pPr>
             <a:r>
-              <a:rPr b="0" lang="en-US" sz="3600" strike="noStrike" u="none">
-                <a:solidFill>
-                  <a:srgbClr val="0000cc"/>
+              <a:rPr lang="en-US" sz="3600" b="0" u="none" strike="noStrike">
+                <a:solidFill>
+                  <a:srgbClr val="0000CC"/>
                 </a:solidFill>
                 <a:effectLst/>
                 <a:uFillTx/>
@@ -727,7 +1128,7 @@
               </a:rPr>
               <a:t>ForestAI Platform </a:t>
             </a:r>
-            <a:endParaRPr b="0" lang="en-US" sz="3600" strike="noStrike" u="none">
+            <a:endParaRPr lang="en-US" sz="3600" b="0" u="none" strike="noStrike">
               <a:solidFill>
                 <a:srgbClr val="000000"/>
               </a:solidFill>
@@ -738,7 +1139,7 @@
           </a:p>
           <a:p>
             <a:r>
-              <a:rPr b="0" lang="en-CA" sz="2800" strike="noStrike" u="none">
+              <a:rPr lang="en-CA" sz="2800" b="0" u="none" strike="noStrike">
                 <a:solidFill>
                   <a:schemeClr val="dk1"/>
                 </a:solidFill>
@@ -748,7 +1149,7 @@
               </a:rPr>
               <a:t>ForestAI integrates data from multiple sources, including drone imagery and ground references from the USDA Forest Service's Forest Inventory and Analysis (FIA) and Forest Health Monitoring (FHM) programs, complementing these approaches with AI-driven capabilities for resources assessment and land management. The platform offers an accessible interface for processing and analyzing data through automated species classification, canopy/tree counting, health assessment, etc. Its real-time data processing, computer vision, tree-level visualization and reporting tools support stakeholders ranging from individual landowners to broad scale operators. </a:t>
             </a:r>
-            <a:endParaRPr b="0" lang="en-US" sz="2800" strike="noStrike" u="none">
+            <a:endParaRPr lang="en-US" sz="2800" b="0" u="none" strike="noStrike">
               <a:solidFill>
                 <a:srgbClr val="000000"/>
               </a:solidFill>
@@ -768,7 +1169,7 @@
         <p:spPr>
           <a:xfrm>
             <a:off x="1204200" y="30651840"/>
-            <a:ext cx="5448600" cy="943560"/>
+            <a:ext cx="5448600" cy="767987"/>
           </a:xfrm>
           <a:prstGeom prst="rect">
             <a:avLst/>
@@ -776,20 +1177,27 @@
           <a:noFill/>
           <a:ln w="0">
             <a:solidFill>
-              <a:srgbClr val="4f81bd"/>
+              <a:srgbClr val="4F81BD"/>
             </a:solidFill>
           </a:ln>
         </p:spPr>
         <p:style>
-          <a:lnRef idx="0"/>
-          <a:fillRef idx="0"/>
-          <a:effectRef idx="0"/>
+          <a:lnRef idx="0">
+            <a:scrgbClr r="0" g="0" b="0"/>
+          </a:lnRef>
+          <a:fillRef idx="0">
+            <a:scrgbClr r="0" g="0" b="0"/>
+          </a:fillRef>
+          <a:effectRef idx="0">
+            <a:scrgbClr r="0" g="0" b="0"/>
+          </a:effectRef>
           <a:fontRef idx="minor"/>
         </p:style>
         <p:txBody>
-          <a:bodyPr lIns="90000" rIns="90000" tIns="45000" bIns="45000" anchor="t">
+          <a:bodyPr lIns="90000" tIns="45000" rIns="90000" bIns="45000" anchor="t">
             <a:spAutoFit/>
           </a:bodyPr>
+          <a:lstStyle/>
           <a:p>
             <a:pPr defTabSz="1567440">
               <a:lnSpc>
@@ -797,7 +1205,7 @@
               </a:lnSpc>
             </a:pPr>
             <a:r>
-              <a:rPr b="1" i="1" lang="en-US" sz="2800" strike="noStrike" u="none">
+              <a:rPr lang="en-US" sz="2200" b="1" i="1" u="none" strike="noStrike" dirty="0">
                 <a:solidFill>
                   <a:schemeClr val="dk1"/>
                 </a:solidFill>
@@ -809,7 +1217,7 @@
               <a:t>Fig. 3.</a:t>
             </a:r>
             <a:r>
-              <a:rPr b="0" i="1" lang="en-US" sz="2800" strike="noStrike" u="none">
+              <a:rPr lang="en-US" sz="2200" b="0" i="1" u="none" strike="noStrike" dirty="0">
                 <a:solidFill>
                   <a:schemeClr val="dk1"/>
                 </a:solidFill>
@@ -821,18 +1229,29 @@
               <a:t> Oak Wilt Observation in S</a:t>
             </a:r>
             <a:r>
-              <a:rPr b="0" i="1" lang="en-CA" sz="2800" strike="noStrike" u="none">
-                <a:solidFill>
-                  <a:schemeClr val="dk1"/>
-                </a:solidFill>
-                <a:effectLst/>
-                <a:uFillTx/>
-                <a:latin typeface="Calibri"/>
-              </a:rPr>
-              <a:t>outheastern United States</a:t>
-            </a:r>
-            <a:r>
-              <a:rPr b="0" i="1" lang="en-US" sz="2800" strike="noStrike" u="none">
+              <a:rPr lang="en-CA" sz="2200" b="0" i="1" u="none" strike="noStrike" dirty="0" err="1">
+                <a:solidFill>
+                  <a:schemeClr val="dk1"/>
+                </a:solidFill>
+                <a:effectLst/>
+                <a:uFillTx/>
+                <a:latin typeface="Calibri"/>
+              </a:rPr>
+              <a:t>outheastern</a:t>
+            </a:r>
+            <a:r>
+              <a:rPr lang="en-CA" sz="2200" b="0" i="1" u="none" strike="noStrike" dirty="0">
+                <a:solidFill>
+                  <a:schemeClr val="dk1"/>
+                </a:solidFill>
+                <a:effectLst/>
+                <a:uFillTx/>
+                <a:latin typeface="Calibri"/>
+              </a:rPr>
+              <a:t> United States</a:t>
+            </a:r>
+            <a:r>
+              <a:rPr lang="en-US" sz="2200" b="0" i="1" u="none" strike="noStrike" dirty="0">
                 <a:solidFill>
                   <a:schemeClr val="dk1"/>
                 </a:solidFill>
@@ -842,7 +1261,7 @@
               </a:rPr>
               <a:t> </a:t>
             </a:r>
-            <a:endParaRPr b="0" lang="en-US" sz="2800" strike="noStrike" u="none">
+            <a:endParaRPr lang="en-US" sz="2200" b="0" u="none" strike="noStrike" dirty="0">
               <a:solidFill>
                 <a:srgbClr val="000000"/>
               </a:solidFill>
@@ -870,20 +1289,27 @@
           <a:noFill/>
           <a:ln w="0">
             <a:solidFill>
-              <a:srgbClr val="4f81bd"/>
+              <a:srgbClr val="4F81BD"/>
             </a:solidFill>
           </a:ln>
         </p:spPr>
         <p:style>
-          <a:lnRef idx="0"/>
-          <a:fillRef idx="0"/>
-          <a:effectRef idx="0"/>
+          <a:lnRef idx="0">
+            <a:scrgbClr r="0" g="0" b="0"/>
+          </a:lnRef>
+          <a:fillRef idx="0">
+            <a:scrgbClr r="0" g="0" b="0"/>
+          </a:fillRef>
+          <a:effectRef idx="0">
+            <a:scrgbClr r="0" g="0" b="0"/>
+          </a:effectRef>
           <a:fontRef idx="minor"/>
         </p:style>
         <p:txBody>
-          <a:bodyPr lIns="90000" rIns="90000" tIns="45000" bIns="45000" anchor="t">
+          <a:bodyPr lIns="90000" tIns="45000" rIns="90000" bIns="45000" anchor="t">
             <a:spAutoFit/>
           </a:bodyPr>
+          <a:lstStyle/>
           <a:p>
             <a:pPr defTabSz="1567440">
               <a:lnSpc>
@@ -891,9 +1317,9 @@
               </a:lnSpc>
             </a:pPr>
             <a:r>
-              <a:rPr b="0" lang="en-US" sz="3600" strike="noStrike" u="none">
-                <a:solidFill>
-                  <a:srgbClr val="0000cc"/>
+              <a:rPr lang="en-US" sz="3600" b="0" u="none" strike="noStrike" dirty="0">
+                <a:solidFill>
+                  <a:srgbClr val="0000CC"/>
                 </a:solidFill>
                 <a:effectLst/>
                 <a:uFillTx/>
@@ -901,7 +1327,7 @@
               </a:rPr>
               <a:t>Priorities and Goals</a:t>
             </a:r>
-            <a:endParaRPr b="0" lang="en-US" sz="3600" strike="noStrike" u="none">
+            <a:endParaRPr lang="en-US" sz="3600" b="0" u="none" strike="noStrike" dirty="0">
               <a:solidFill>
                 <a:srgbClr val="000000"/>
               </a:solidFill>
@@ -917,7 +1343,7 @@
               </a:lnSpc>
             </a:pPr>
             <a:r>
-              <a:rPr b="0" lang="en-CA" sz="2800" strike="noStrike" u="none">
+              <a:rPr lang="en-CA" sz="2800" b="0" u="none" strike="noStrike" dirty="0">
                 <a:solidFill>
                   <a:schemeClr val="dk1"/>
                 </a:solidFill>
@@ -927,7 +1353,7 @@
               </a:rPr>
               <a:t>Current research priorities include validating the platform's effectiveness with existing data sources and real-world applications, particularly for  early detection of pests and diseases. Future development will focus on integrating emerging technologies, high-resolution satellite imagery and structural measurements and advanced drone observations, to improve scalability. This research contributes to modernizing forest monitoring, data analytics, and decision-making support in the southeastern U.S., to enhance forest productivity and resilience while maintaining high standards of accuracy in resource assessment.</a:t>
             </a:r>
-            <a:endParaRPr b="0" lang="en-US" sz="2800" strike="noStrike" u="none">
+            <a:endParaRPr lang="en-US" sz="2800" b="0" u="none" strike="noStrike" dirty="0">
               <a:solidFill>
                 <a:srgbClr val="000000"/>
               </a:solidFill>
@@ -946,8 +1372,8 @@
         </p:nvSpPr>
         <p:spPr>
           <a:xfrm>
-            <a:off x="17607600" y="15207480"/>
-            <a:ext cx="3657600" cy="517320"/>
+            <a:off x="15951200" y="15207480"/>
+            <a:ext cx="5314000" cy="521766"/>
           </a:xfrm>
           <a:prstGeom prst="rect">
             <a:avLst/>
@@ -955,20 +1381,27 @@
           <a:noFill/>
           <a:ln w="0">
             <a:solidFill>
-              <a:srgbClr val="4f81bd"/>
+              <a:srgbClr val="4F81BD"/>
             </a:solidFill>
           </a:ln>
         </p:spPr>
         <p:style>
-          <a:lnRef idx="0"/>
-          <a:fillRef idx="0"/>
-          <a:effectRef idx="0"/>
+          <a:lnRef idx="0">
+            <a:scrgbClr r="0" g="0" b="0"/>
+          </a:lnRef>
+          <a:fillRef idx="0">
+            <a:scrgbClr r="0" g="0" b="0"/>
+          </a:fillRef>
+          <a:effectRef idx="0">
+            <a:scrgbClr r="0" g="0" b="0"/>
+          </a:effectRef>
           <a:fontRef idx="minor"/>
         </p:style>
         <p:txBody>
-          <a:bodyPr lIns="90000" rIns="90000" tIns="45000" bIns="45000" anchor="t">
+          <a:bodyPr wrap="square" lIns="90000" tIns="45000" rIns="90000" bIns="45000" anchor="t">
             <a:spAutoFit/>
           </a:bodyPr>
+          <a:lstStyle/>
           <a:p>
             <a:pPr defTabSz="1567440">
               <a:lnSpc>
@@ -976,7 +1409,7 @@
               </a:lnSpc>
             </a:pPr>
             <a:r>
-              <a:rPr b="1" i="1" lang="en-US" sz="2800" strike="noStrike" u="none">
+              <a:rPr lang="en-US" sz="2800" b="1" i="1" u="none" strike="noStrike" dirty="0">
                 <a:solidFill>
                   <a:schemeClr val="dk1"/>
                 </a:solidFill>
@@ -987,18 +1420,29 @@
               <a:t>Fig. 1. </a:t>
             </a:r>
             <a:r>
-              <a:rPr b="0" i="1" lang="en-US" sz="2800" strike="noStrike" u="none">
-                <a:solidFill>
-                  <a:schemeClr val="dk1"/>
-                </a:solidFill>
-                <a:effectLst/>
-                <a:uFillTx/>
-                <a:latin typeface="Calibri"/>
-              </a:rPr>
-              <a:t>ForestAI Platform</a:t>
-            </a:r>
-            <a:r>
-              <a:rPr b="1" i="1" lang="en-US" sz="2800" strike="noStrike" u="none">
+              <a:rPr lang="en-US" sz="2800" b="0" i="1" u="none" strike="noStrike" dirty="0" err="1">
+                <a:solidFill>
+                  <a:schemeClr val="dk1"/>
+                </a:solidFill>
+                <a:effectLst/>
+                <a:uFillTx/>
+                <a:latin typeface="Calibri"/>
+              </a:rPr>
+              <a:t>ForestAI</a:t>
+            </a:r>
+            <a:r>
+              <a:rPr lang="en-US" sz="2800" b="0" i="1" u="none" strike="noStrike" dirty="0">
+                <a:solidFill>
+                  <a:schemeClr val="dk1"/>
+                </a:solidFill>
+                <a:effectLst/>
+                <a:uFillTx/>
+                <a:latin typeface="Calibri"/>
+              </a:rPr>
+              <a:t> Platform Platform</a:t>
+            </a:r>
+            <a:r>
+              <a:rPr lang="en-US" sz="2800" b="1" i="1" u="none" strike="noStrike" dirty="0">
                 <a:solidFill>
                   <a:schemeClr val="dk1"/>
                 </a:solidFill>
@@ -1008,7 +1452,7 @@
               </a:rPr>
               <a:t> </a:t>
             </a:r>
-            <a:endParaRPr b="0" lang="en-US" sz="2800" strike="noStrike" u="none">
+            <a:endParaRPr lang="en-US" sz="2800" b="0" u="none" strike="noStrike" dirty="0">
               <a:solidFill>
                 <a:srgbClr val="000000"/>
               </a:solidFill>
@@ -1021,17 +1465,17 @@
       </p:sp>
       <p:pic>
         <p:nvPicPr>
-          <p:cNvPr id="8" name="" descr=""/>
+          <p:cNvPr id="8" name="Picture 7"/>
           <p:cNvPicPr/>
           <p:nvPr/>
         </p:nvPicPr>
         <p:blipFill>
-          <a:blip r:embed="rId1"/>
+          <a:blip r:embed="rId2"/>
           <a:stretch/>
         </p:blipFill>
         <p:spPr>
           <a:xfrm>
-            <a:off x="10936800" y="9500400"/>
+            <a:off x="10936800" y="9436900"/>
             <a:ext cx="10505880" cy="5815800"/>
           </a:xfrm>
           <a:prstGeom prst="rect">
@@ -1060,20 +1504,27 @@
           <a:noFill/>
           <a:ln w="0">
             <a:solidFill>
-              <a:srgbClr val="4f81bd"/>
+              <a:srgbClr val="4F81BD"/>
             </a:solidFill>
           </a:ln>
         </p:spPr>
         <p:style>
-          <a:lnRef idx="0"/>
-          <a:fillRef idx="0"/>
-          <a:effectRef idx="0"/>
+          <a:lnRef idx="0">
+            <a:scrgbClr r="0" g="0" b="0"/>
+          </a:lnRef>
+          <a:fillRef idx="0">
+            <a:scrgbClr r="0" g="0" b="0"/>
+          </a:fillRef>
+          <a:effectRef idx="0">
+            <a:scrgbClr r="0" g="0" b="0"/>
+          </a:effectRef>
           <a:fontRef idx="minor"/>
         </p:style>
         <p:txBody>
-          <a:bodyPr lIns="90000" rIns="90000" tIns="45000" bIns="45000" anchor="t">
+          <a:bodyPr lIns="90000" tIns="45000" rIns="90000" bIns="45000" anchor="t">
             <a:spAutoFit/>
           </a:bodyPr>
+          <a:lstStyle/>
           <a:p>
             <a:pPr defTabSz="1567440">
               <a:lnSpc>
@@ -1081,7 +1532,7 @@
               </a:lnSpc>
             </a:pPr>
             <a:r>
-              <a:rPr b="1" i="1" lang="en-US" sz="2800" strike="noStrike" u="none">
+              <a:rPr lang="en-US" sz="2800" b="1" i="1" u="none" strike="noStrike">
                 <a:solidFill>
                   <a:schemeClr val="dk1"/>
                 </a:solidFill>
@@ -1092,7 +1543,7 @@
               <a:t>Fig.2. </a:t>
             </a:r>
             <a:r>
-              <a:rPr b="0" i="1" lang="en-US" sz="2800" strike="noStrike" u="none">
+              <a:rPr lang="en-US" sz="2800" b="0" i="1" u="none" strike="noStrike">
                 <a:solidFill>
                   <a:schemeClr val="dk1"/>
                 </a:solidFill>
@@ -1102,7 +1553,7 @@
               </a:rPr>
               <a:t>Oak Wilt Disease Prediction Workflow</a:t>
             </a:r>
-            <a:endParaRPr b="0" lang="en-US" sz="2800" strike="noStrike" u="none">
+            <a:endParaRPr lang="en-US" sz="2800" b="0" u="none" strike="noStrike">
               <a:solidFill>
                 <a:srgbClr val="000000"/>
               </a:solidFill>
@@ -1115,17 +1566,17 @@
       </p:sp>
       <p:pic>
         <p:nvPicPr>
-          <p:cNvPr id="10" name="" descr=""/>
+          <p:cNvPr id="10" name="Picture 9"/>
           <p:cNvPicPr/>
           <p:nvPr/>
         </p:nvPicPr>
         <p:blipFill>
-          <a:blip r:embed="rId2"/>
+          <a:blip r:embed="rId3"/>
           <a:stretch/>
         </p:blipFill>
         <p:spPr>
           <a:xfrm>
-            <a:off x="793800" y="23774400"/>
+            <a:off x="944080" y="23807880"/>
             <a:ext cx="6383520" cy="6784200"/>
           </a:xfrm>
           <a:prstGeom prst="rect">
@@ -1139,31 +1590,7 @@
       </p:pic>
       <p:pic>
         <p:nvPicPr>
-          <p:cNvPr id="11" name="" descr=""/>
-          <p:cNvPicPr/>
-          <p:nvPr/>
-        </p:nvPicPr>
-        <p:blipFill>
-          <a:blip r:embed="rId3"/>
-          <a:stretch/>
-        </p:blipFill>
-        <p:spPr>
-          <a:xfrm>
-            <a:off x="842400" y="18516600"/>
-            <a:ext cx="20369520" cy="5029200"/>
-          </a:xfrm>
-          <a:prstGeom prst="rect">
-            <a:avLst/>
-          </a:prstGeom>
-          <a:noFill/>
-          <a:ln w="0">
-            <a:noFill/>
-          </a:ln>
-        </p:spPr>
-      </p:pic>
-      <p:pic>
-        <p:nvPicPr>
-          <p:cNvPr id="12" name="" descr=""/>
+          <p:cNvPr id="11" name="Picture 10"/>
           <p:cNvPicPr/>
           <p:nvPr/>
         </p:nvPicPr>
@@ -1173,32 +1600,8 @@
         </p:blipFill>
         <p:spPr>
           <a:xfrm>
-            <a:off x="7506360" y="23734080"/>
-            <a:ext cx="4609440" cy="3913920"/>
-          </a:xfrm>
-          <a:prstGeom prst="rect">
-            <a:avLst/>
-          </a:prstGeom>
-          <a:noFill/>
-          <a:ln w="0">
-            <a:noFill/>
-          </a:ln>
-        </p:spPr>
-      </p:pic>
-      <p:pic>
-        <p:nvPicPr>
-          <p:cNvPr id="13" name="" descr=""/>
-          <p:cNvPicPr/>
-          <p:nvPr/>
-        </p:nvPicPr>
-        <p:blipFill>
-          <a:blip r:embed="rId5"/>
-          <a:stretch/>
-        </p:blipFill>
-        <p:spPr>
-          <a:xfrm>
-            <a:off x="7543800" y="28344600"/>
-            <a:ext cx="4572000" cy="2286000"/>
+            <a:off x="842400" y="18516600"/>
+            <a:ext cx="20369520" cy="5029200"/>
           </a:xfrm>
           <a:prstGeom prst="rect">
             <a:avLst/>
@@ -1217,8 +1620,8 @@
         </p:nvSpPr>
         <p:spPr>
           <a:xfrm>
-            <a:off x="7353000" y="27720000"/>
-            <a:ext cx="4762800" cy="425520"/>
+            <a:off x="7353000" y="27554900"/>
+            <a:ext cx="5054900" cy="429433"/>
           </a:xfrm>
           <a:prstGeom prst="rect">
             <a:avLst/>
@@ -1226,20 +1629,27 @@
           <a:noFill/>
           <a:ln w="0">
             <a:solidFill>
-              <a:srgbClr val="4f81bd"/>
+              <a:srgbClr val="4F81BD"/>
             </a:solidFill>
           </a:ln>
         </p:spPr>
         <p:style>
-          <a:lnRef idx="0"/>
-          <a:fillRef idx="0"/>
-          <a:effectRef idx="0"/>
+          <a:lnRef idx="0">
+            <a:scrgbClr r="0" g="0" b="0"/>
+          </a:lnRef>
+          <a:fillRef idx="0">
+            <a:scrgbClr r="0" g="0" b="0"/>
+          </a:fillRef>
+          <a:effectRef idx="0">
+            <a:scrgbClr r="0" g="0" b="0"/>
+          </a:effectRef>
           <a:fontRef idx="minor"/>
         </p:style>
         <p:txBody>
-          <a:bodyPr lIns="90000" rIns="90000" tIns="45000" bIns="45000" anchor="t">
+          <a:bodyPr wrap="square" lIns="90000" tIns="45000" rIns="90000" bIns="45000" anchor="t">
             <a:spAutoFit/>
           </a:bodyPr>
+          <a:lstStyle/>
           <a:p>
             <a:pPr defTabSz="1567440">
               <a:lnSpc>
@@ -1247,7 +1657,7 @@
               </a:lnSpc>
             </a:pPr>
             <a:r>
-              <a:rPr b="1" i="1" lang="en-US" sz="2200" strike="noStrike" u="none">
+              <a:rPr lang="en-US" sz="2200" b="1" i="1" u="none" strike="noStrike" dirty="0">
                 <a:solidFill>
                   <a:schemeClr val="dk1"/>
                 </a:solidFill>
@@ -1259,31 +1669,19 @@
               <a:t>Fig.4.</a:t>
             </a:r>
             <a:r>
-              <a:rPr b="0" i="1" lang="en-US" sz="2200" strike="noStrike" u="none">
-                <a:solidFill>
-                  <a:schemeClr val="dk1"/>
-                </a:solidFill>
-                <a:effectLst/>
-                <a:uFillTx/>
-                <a:latin typeface="Calibri"/>
-                <a:ea typeface="PingFang SC"/>
-              </a:rPr>
-              <a:t> Environmental Variables </a:t>
-            </a:r>
-            <a:r>
-              <a:rPr b="0" i="1" lang="en-CA" sz="2200" strike="noStrike" u="none">
-                <a:solidFill>
-                  <a:schemeClr val="dk1"/>
-                </a:solidFill>
-                <a:effectLst/>
-                <a:uFillTx/>
-                <a:latin typeface="Calibri"/>
-                <a:ea typeface="PingFang SC"/>
-              </a:rPr>
-              <a:t>Selection</a:t>
-            </a:r>
-            <a:r>
-              <a:rPr b="0" i="1" lang="en-US" sz="2200" strike="noStrike" u="none">
+              <a:rPr lang="en-US" sz="2200" b="0" i="1" u="none" strike="noStrike" dirty="0">
+                <a:solidFill>
+                  <a:schemeClr val="dk1"/>
+                </a:solidFill>
+                <a:effectLst/>
+                <a:uFillTx/>
+                <a:latin typeface="Calibri"/>
+                <a:ea typeface="PingFang SC"/>
+              </a:rPr>
+              <a:t> Area of Interest for Model Training</a:t>
+            </a:r>
+            <a:r>
+              <a:rPr lang="en-US" sz="2200" b="0" i="1" u="none" strike="noStrike" dirty="0">
                 <a:solidFill>
                   <a:schemeClr val="dk1"/>
                 </a:solidFill>
@@ -1293,7 +1691,7 @@
               </a:rPr>
               <a:t> </a:t>
             </a:r>
-            <a:endParaRPr b="0" lang="en-US" sz="2200" strike="noStrike" u="none">
+            <a:endParaRPr lang="en-US" sz="2200" b="0" u="none" strike="noStrike" dirty="0">
               <a:solidFill>
                 <a:srgbClr val="000000"/>
               </a:solidFill>
@@ -1312,8 +1710,8 @@
         </p:nvSpPr>
         <p:spPr>
           <a:xfrm>
-            <a:off x="7086600" y="30892680"/>
-            <a:ext cx="5220000" cy="425520"/>
+            <a:off x="8153400" y="31108580"/>
+            <a:ext cx="3378483" cy="425520"/>
           </a:xfrm>
           <a:prstGeom prst="rect">
             <a:avLst/>
@@ -1321,20 +1719,27 @@
           <a:noFill/>
           <a:ln w="0">
             <a:solidFill>
-              <a:srgbClr val="4f81bd"/>
+              <a:srgbClr val="4F81BD"/>
             </a:solidFill>
           </a:ln>
         </p:spPr>
         <p:style>
-          <a:lnRef idx="0"/>
-          <a:fillRef idx="0"/>
-          <a:effectRef idx="0"/>
+          <a:lnRef idx="0">
+            <a:scrgbClr r="0" g="0" b="0"/>
+          </a:lnRef>
+          <a:fillRef idx="0">
+            <a:scrgbClr r="0" g="0" b="0"/>
+          </a:fillRef>
+          <a:effectRef idx="0">
+            <a:scrgbClr r="0" g="0" b="0"/>
+          </a:effectRef>
           <a:fontRef idx="minor"/>
         </p:style>
         <p:txBody>
-          <a:bodyPr lIns="90000" rIns="90000" tIns="45000" bIns="45000" anchor="t">
+          <a:bodyPr wrap="square" lIns="90000" tIns="45000" rIns="90000" bIns="45000" anchor="t">
             <a:spAutoFit/>
           </a:bodyPr>
+          <a:lstStyle/>
           <a:p>
             <a:pPr defTabSz="1567440">
               <a:lnSpc>
@@ -1342,31 +1747,31 @@
               </a:lnSpc>
             </a:pPr>
             <a:r>
-              <a:rPr b="1" i="1" lang="en-US" sz="2200" strike="noStrike" u="none">
-                <a:solidFill>
-                  <a:schemeClr val="dk1"/>
-                </a:solidFill>
-                <a:effectLst/>
-                <a:uFillTx/>
-                <a:latin typeface="Calibri"/>
-                <a:ea typeface="PingFang SC"/>
-              </a:rPr>
-              <a:t>Fig.4.</a:t>
-            </a:r>
-            <a:r>
-              <a:rPr b="0" i="1" lang="en-US" sz="2200" strike="noStrike" u="none">
-                <a:solidFill>
-                  <a:schemeClr val="dk1"/>
-                </a:solidFill>
-                <a:effectLst/>
-                <a:uFillTx/>
-                <a:latin typeface="Calibri"/>
-                <a:ea typeface="PingFang SC"/>
-              </a:rPr>
-              <a:t> Feature Analyses for Optimized Model</a:t>
-            </a:r>
-            <a:r>
-              <a:rPr b="0" i="1" lang="en-US" sz="2200" strike="noStrike" u="none">
+              <a:rPr lang="en-US" sz="2200" b="1" i="1" u="none" strike="noStrike" dirty="0">
+                <a:solidFill>
+                  <a:schemeClr val="dk1"/>
+                </a:solidFill>
+                <a:effectLst/>
+                <a:uFillTx/>
+                <a:latin typeface="Calibri"/>
+                <a:ea typeface="PingFang SC"/>
+              </a:rPr>
+              <a:t>Fig.5.</a:t>
+            </a:r>
+            <a:r>
+              <a:rPr lang="en-US" sz="2200" b="0" i="1" u="none" strike="noStrike" dirty="0">
+                <a:solidFill>
+                  <a:schemeClr val="dk1"/>
+                </a:solidFill>
+                <a:effectLst/>
+                <a:uFillTx/>
+                <a:latin typeface="Calibri"/>
+                <a:ea typeface="PingFang SC"/>
+              </a:rPr>
+              <a:t> Model Comparison</a:t>
+            </a:r>
+            <a:r>
+              <a:rPr lang="en-US" sz="2200" b="0" i="1" u="none" strike="noStrike" dirty="0">
                 <a:solidFill>
                   <a:schemeClr val="dk1"/>
                 </a:solidFill>
@@ -1376,7 +1781,7 @@
               </a:rPr>
               <a:t> </a:t>
             </a:r>
-            <a:endParaRPr b="0" lang="en-US" sz="2200" strike="noStrike" u="none">
+            <a:endParaRPr lang="en-US" sz="2200" b="0" u="none" strike="noStrike" dirty="0">
               <a:solidFill>
                 <a:srgbClr val="000000"/>
               </a:solidFill>
@@ -1387,55 +1792,471 @@
           </a:p>
         </p:txBody>
       </p:sp>
+      <p:pic>
+        <p:nvPicPr>
+          <p:cNvPr id="18" name="Picture 17" descr="A map of a hurricane&#10;&#10;AI-generated content may be incorrect.">
+            <a:extLst>
+              <a:ext uri="{FF2B5EF4-FFF2-40B4-BE49-F238E27FC236}">
+                <a16:creationId xmlns:a16="http://schemas.microsoft.com/office/drawing/2014/main" id="{F61C4973-6408-2685-253B-2A7072BA11CA}"/>
+              </a:ext>
+            </a:extLst>
+          </p:cNvPr>
+          <p:cNvPicPr>
+            <a:picLocks noChangeAspect="1"/>
+          </p:cNvPicPr>
+          <p:nvPr/>
+        </p:nvPicPr>
+        <p:blipFill>
+          <a:blip r:embed="rId5">
+            <a:extLst>
+              <a:ext uri="{28A0092B-C50C-407E-A947-70E740481C1C}">
+                <a14:useLocalDpi xmlns:a14="http://schemas.microsoft.com/office/drawing/2010/main" val="0"/>
+              </a:ext>
+            </a:extLst>
+          </a:blip>
+          <a:stretch>
+            <a:fillRect/>
+          </a:stretch>
+        </p:blipFill>
+        <p:spPr>
+          <a:xfrm>
+            <a:off x="12676900" y="23670580"/>
+            <a:ext cx="8373300" cy="7449775"/>
+          </a:xfrm>
+          <a:prstGeom prst="rect">
+            <a:avLst/>
+          </a:prstGeom>
+        </p:spPr>
+      </p:pic>
+      <p:sp>
+        <p:nvSpPr>
+          <p:cNvPr id="19" name="TextBox 13">
+            <a:extLst>
+              <a:ext uri="{FF2B5EF4-FFF2-40B4-BE49-F238E27FC236}">
+                <a16:creationId xmlns:a16="http://schemas.microsoft.com/office/drawing/2014/main" id="{C1EC16C6-45CE-F7AE-24F6-459E96F2C827}"/>
+              </a:ext>
+            </a:extLst>
+          </p:cNvPr>
+          <p:cNvSpPr/>
+          <p:nvPr/>
+        </p:nvSpPr>
+        <p:spPr>
+          <a:xfrm>
+            <a:off x="12640800" y="31133055"/>
+            <a:ext cx="8801880" cy="767987"/>
+          </a:xfrm>
+          <a:prstGeom prst="rect">
+            <a:avLst/>
+          </a:prstGeom>
+          <a:noFill/>
+          <a:ln w="0">
+            <a:solidFill>
+              <a:srgbClr val="4F81BD"/>
+            </a:solidFill>
+          </a:ln>
+        </p:spPr>
+        <p:style>
+          <a:lnRef idx="0">
+            <a:scrgbClr r="0" g="0" b="0"/>
+          </a:lnRef>
+          <a:fillRef idx="0">
+            <a:scrgbClr r="0" g="0" b="0"/>
+          </a:fillRef>
+          <a:effectRef idx="0">
+            <a:scrgbClr r="0" g="0" b="0"/>
+          </a:effectRef>
+          <a:fontRef idx="minor"/>
+        </p:style>
+        <p:txBody>
+          <a:bodyPr wrap="square" lIns="90000" tIns="45000" rIns="90000" bIns="45000" anchor="t">
+            <a:spAutoFit/>
+          </a:bodyPr>
+          <a:lstStyle/>
+          <a:p>
+            <a:pPr defTabSz="1567440"/>
+            <a:r>
+              <a:rPr lang="en-US" sz="2200" b="1" i="1" u="none" strike="noStrike" dirty="0">
+                <a:solidFill>
+                  <a:schemeClr val="dk1"/>
+                </a:solidFill>
+                <a:effectLst/>
+                <a:uFillTx/>
+                <a:latin typeface="Calibri"/>
+                <a:ea typeface="PingFang SC"/>
+              </a:rPr>
+              <a:t>Fig. 6.</a:t>
+            </a:r>
+            <a:r>
+              <a:rPr lang="en-US" sz="2200" b="0" i="1" u="none" strike="noStrike" dirty="0">
+                <a:solidFill>
+                  <a:schemeClr val="dk1"/>
+                </a:solidFill>
+                <a:effectLst/>
+                <a:uFillTx/>
+                <a:latin typeface="Calibri"/>
+                <a:ea typeface="PingFang SC"/>
+              </a:rPr>
+              <a:t> </a:t>
+            </a:r>
+            <a:r>
+              <a:rPr lang="en-US" sz="2200" i="1" dirty="0">
+                <a:solidFill>
+                  <a:schemeClr val="dk1"/>
+                </a:solidFill>
+                <a:latin typeface="Calibri"/>
+                <a:ea typeface="PingFang SC"/>
+              </a:rPr>
+              <a:t>Model </a:t>
+            </a:r>
+            <a:r>
+              <a:rPr lang="en-US" sz="2200" b="0" i="1" u="none" strike="noStrike" dirty="0">
+                <a:solidFill>
+                  <a:schemeClr val="dk1"/>
+                </a:solidFill>
+                <a:effectLst/>
+                <a:uFillTx/>
+                <a:latin typeface="Calibri"/>
+                <a:ea typeface="PingFang SC"/>
+              </a:rPr>
+              <a:t>Prediction for the Minnesota State with Future Environment</a:t>
+            </a:r>
+          </a:p>
+          <a:p>
+            <a:pPr defTabSz="1567440"/>
+            <a:r>
+              <a:rPr lang="en-US" sz="2200" b="0" i="1" u="none" strike="noStrike" dirty="0">
+                <a:solidFill>
+                  <a:schemeClr val="dk1"/>
+                </a:solidFill>
+                <a:effectLst/>
+                <a:uFillTx/>
+                <a:latin typeface="Calibri"/>
+                <a:ea typeface="PingFang SC"/>
+              </a:rPr>
+              <a:t> </a:t>
+            </a:r>
+            <a:r>
+              <a:rPr lang="en-US" sz="2200" b="0" i="1" u="none" strike="noStrike" dirty="0">
+                <a:solidFill>
+                  <a:schemeClr val="dk1"/>
+                </a:solidFill>
+                <a:effectLst/>
+                <a:uFillTx/>
+                <a:latin typeface="Calibri"/>
+              </a:rPr>
+              <a:t> </a:t>
+            </a:r>
+            <a:endParaRPr lang="en-US" sz="2200" b="0" u="none" strike="noStrike" dirty="0">
+              <a:solidFill>
+                <a:srgbClr val="000000"/>
+              </a:solidFill>
+              <a:effectLst/>
+              <a:uFillTx/>
+              <a:latin typeface="Arial"/>
+            </a:endParaRPr>
+          </a:p>
+        </p:txBody>
+      </p:sp>
+      <p:pic>
+        <p:nvPicPr>
+          <p:cNvPr id="20" name="Picture 19">
+            <a:extLst>
+              <a:ext uri="{FF2B5EF4-FFF2-40B4-BE49-F238E27FC236}">
+                <a16:creationId xmlns:a16="http://schemas.microsoft.com/office/drawing/2014/main" id="{51080F54-6AD2-4045-3FEF-19A2EE64E84B}"/>
+              </a:ext>
+            </a:extLst>
+          </p:cNvPr>
+          <p:cNvPicPr>
+            <a:picLocks noChangeAspect="1"/>
+          </p:cNvPicPr>
+          <p:nvPr/>
+        </p:nvPicPr>
+        <p:blipFill>
+          <a:blip r:embed="rId6"/>
+          <a:stretch>
+            <a:fillRect/>
+          </a:stretch>
+        </p:blipFill>
+        <p:spPr>
+          <a:xfrm>
+            <a:off x="7914100" y="23807880"/>
+            <a:ext cx="4171835" cy="3679443"/>
+          </a:xfrm>
+          <a:prstGeom prst="rect">
+            <a:avLst/>
+          </a:prstGeom>
+        </p:spPr>
+      </p:pic>
+      <p:sp>
+        <p:nvSpPr>
+          <p:cNvPr id="22" name="Rectangle 21">
+            <a:extLst>
+              <a:ext uri="{FF2B5EF4-FFF2-40B4-BE49-F238E27FC236}">
+                <a16:creationId xmlns:a16="http://schemas.microsoft.com/office/drawing/2014/main" id="{B929C6DE-C82C-8733-B65F-D1DA67D33249}"/>
+              </a:ext>
+            </a:extLst>
+          </p:cNvPr>
+          <p:cNvSpPr/>
+          <p:nvPr/>
+        </p:nvSpPr>
+        <p:spPr>
+          <a:xfrm>
+            <a:off x="2929340" y="24625300"/>
+            <a:ext cx="1312460" cy="1365766"/>
+          </a:xfrm>
+          <a:prstGeom prst="rect">
+            <a:avLst/>
+          </a:prstGeom>
+          <a:noFill/>
+          <a:ln>
+            <a:solidFill>
+              <a:srgbClr val="FF0000"/>
+            </a:solidFill>
+          </a:ln>
+        </p:spPr>
+        <p:style>
+          <a:lnRef idx="2">
+            <a:schemeClr val="accent1">
+              <a:shade val="15000"/>
+            </a:schemeClr>
+          </a:lnRef>
+          <a:fillRef idx="1">
+            <a:schemeClr val="accent1"/>
+          </a:fillRef>
+          <a:effectRef idx="0">
+            <a:schemeClr val="accent1"/>
+          </a:effectRef>
+          <a:fontRef idx="minor">
+            <a:schemeClr val="lt1"/>
+          </a:fontRef>
+        </p:style>
+        <p:txBody>
+          <a:bodyPr rtlCol="0" anchor="ctr"/>
+          <a:lstStyle/>
+          <a:p>
+            <a:pPr algn="ctr"/>
+            <a:endParaRPr lang="en-US"/>
+          </a:p>
+        </p:txBody>
+      </p:sp>
+      <p:sp>
+        <p:nvSpPr>
+          <p:cNvPr id="25" name="Rectangle 24">
+            <a:extLst>
+              <a:ext uri="{FF2B5EF4-FFF2-40B4-BE49-F238E27FC236}">
+                <a16:creationId xmlns:a16="http://schemas.microsoft.com/office/drawing/2014/main" id="{D6BB5B2B-25AC-50CA-CB8E-D7ABA2214A60}"/>
+              </a:ext>
+            </a:extLst>
+          </p:cNvPr>
+          <p:cNvSpPr/>
+          <p:nvPr/>
+        </p:nvSpPr>
+        <p:spPr>
+          <a:xfrm>
+            <a:off x="8203600" y="24000976"/>
+            <a:ext cx="3785200" cy="3177023"/>
+          </a:xfrm>
+          <a:prstGeom prst="rect">
+            <a:avLst/>
+          </a:prstGeom>
+          <a:noFill/>
+          <a:ln w="63500">
+            <a:solidFill>
+              <a:srgbClr val="FF0000"/>
+            </a:solidFill>
+          </a:ln>
+        </p:spPr>
+        <p:style>
+          <a:lnRef idx="2">
+            <a:schemeClr val="accent1">
+              <a:shade val="15000"/>
+            </a:schemeClr>
+          </a:lnRef>
+          <a:fillRef idx="1">
+            <a:schemeClr val="accent1"/>
+          </a:fillRef>
+          <a:effectRef idx="0">
+            <a:schemeClr val="accent1"/>
+          </a:effectRef>
+          <a:fontRef idx="minor">
+            <a:schemeClr val="lt1"/>
+          </a:fontRef>
+        </p:style>
+        <p:txBody>
+          <a:bodyPr rtlCol="0" anchor="ctr"/>
+          <a:lstStyle/>
+          <a:p>
+            <a:pPr algn="ctr"/>
+            <a:endParaRPr lang="en-US"/>
+          </a:p>
+        </p:txBody>
+      </p:sp>
+      <p:cxnSp>
+        <p:nvCxnSpPr>
+          <p:cNvPr id="27" name="Straight Connector 26">
+            <a:extLst>
+              <a:ext uri="{FF2B5EF4-FFF2-40B4-BE49-F238E27FC236}">
+                <a16:creationId xmlns:a16="http://schemas.microsoft.com/office/drawing/2014/main" id="{05CF969E-FB6D-AACE-08F8-44D3A793C592}"/>
+              </a:ext>
+            </a:extLst>
+          </p:cNvPr>
+          <p:cNvCxnSpPr>
+            <a:cxnSpLocks/>
+          </p:cNvCxnSpPr>
+          <p:nvPr/>
+        </p:nvCxnSpPr>
+        <p:spPr>
+          <a:xfrm flipV="1">
+            <a:off x="4241800" y="24000976"/>
+            <a:ext cx="3961800" cy="624324"/>
+          </a:xfrm>
+          <a:prstGeom prst="line">
+            <a:avLst/>
+          </a:prstGeom>
+          <a:ln w="12700">
+            <a:solidFill>
+              <a:srgbClr val="FF0000"/>
+            </a:solidFill>
+          </a:ln>
+        </p:spPr>
+        <p:style>
+          <a:lnRef idx="1">
+            <a:schemeClr val="accent1"/>
+          </a:lnRef>
+          <a:fillRef idx="0">
+            <a:schemeClr val="accent1"/>
+          </a:fillRef>
+          <a:effectRef idx="0">
+            <a:schemeClr val="accent1"/>
+          </a:effectRef>
+          <a:fontRef idx="minor">
+            <a:schemeClr val="tx1"/>
+          </a:fontRef>
+        </p:style>
+      </p:cxnSp>
+      <p:cxnSp>
+        <p:nvCxnSpPr>
+          <p:cNvPr id="31" name="Straight Connector 30">
+            <a:extLst>
+              <a:ext uri="{FF2B5EF4-FFF2-40B4-BE49-F238E27FC236}">
+                <a16:creationId xmlns:a16="http://schemas.microsoft.com/office/drawing/2014/main" id="{FAAF1381-6438-29CF-E73C-88E15A0B94AD}"/>
+              </a:ext>
+            </a:extLst>
+          </p:cNvPr>
+          <p:cNvCxnSpPr>
+            <a:cxnSpLocks/>
+          </p:cNvCxnSpPr>
+          <p:nvPr/>
+        </p:nvCxnSpPr>
+        <p:spPr>
+          <a:xfrm>
+            <a:off x="4241800" y="25991066"/>
+            <a:ext cx="3949700" cy="1186933"/>
+          </a:xfrm>
+          <a:prstGeom prst="line">
+            <a:avLst/>
+          </a:prstGeom>
+          <a:ln w="12700">
+            <a:solidFill>
+              <a:srgbClr val="FF0000"/>
+            </a:solidFill>
+          </a:ln>
+        </p:spPr>
+        <p:style>
+          <a:lnRef idx="1">
+            <a:schemeClr val="accent1"/>
+          </a:lnRef>
+          <a:fillRef idx="0">
+            <a:schemeClr val="accent1"/>
+          </a:fillRef>
+          <a:effectRef idx="0">
+            <a:schemeClr val="accent1"/>
+          </a:effectRef>
+          <a:fontRef idx="minor">
+            <a:schemeClr val="tx1"/>
+          </a:fontRef>
+        </p:style>
+      </p:cxnSp>
+      <p:pic>
+        <p:nvPicPr>
+          <p:cNvPr id="35" name="Picture 34" descr="A graph of different colored bars&#10;&#10;AI-generated content may be incorrect.">
+            <a:extLst>
+              <a:ext uri="{FF2B5EF4-FFF2-40B4-BE49-F238E27FC236}">
+                <a16:creationId xmlns:a16="http://schemas.microsoft.com/office/drawing/2014/main" id="{C511DD3E-D273-5A71-4CF3-7266304F8804}"/>
+              </a:ext>
+            </a:extLst>
+          </p:cNvPr>
+          <p:cNvPicPr>
+            <a:picLocks noChangeAspect="1"/>
+          </p:cNvPicPr>
+          <p:nvPr/>
+        </p:nvPicPr>
+        <p:blipFill>
+          <a:blip r:embed="rId7">
+            <a:extLst>
+              <a:ext uri="{28A0092B-C50C-407E-A947-70E740481C1C}">
+                <a14:useLocalDpi xmlns:a14="http://schemas.microsoft.com/office/drawing/2010/main" val="0"/>
+              </a:ext>
+            </a:extLst>
+          </a:blip>
+          <a:stretch>
+            <a:fillRect/>
+          </a:stretch>
+        </p:blipFill>
+        <p:spPr>
+          <a:xfrm>
+            <a:off x="7660100" y="28029324"/>
+            <a:ext cx="4489335" cy="2962854"/>
+          </a:xfrm>
+          <a:prstGeom prst="rect">
+            <a:avLst/>
+          </a:prstGeom>
+        </p:spPr>
+      </p:pic>
     </p:spTree>
   </p:cSld>
-  <mc:AlternateContent>
-    <mc:Choice Requires="p14">
-      <p:transition spd="slow" p14:dur="2000"/>
-    </mc:Choice>
-    <mc:Fallback>
-      <p:transition spd="slow"/>
-    </mc:Fallback>
-  </mc:AlternateContent>
+  <p:clrMapOvr>
+    <a:masterClrMapping/>
+  </p:clrMapOvr>
 </p:sld>
 </file>
 
 <file path=ppt/theme/theme1.xml><?xml version="1.0" encoding="utf-8"?>
-<a:theme xmlns:a="http://schemas.openxmlformats.org/drawingml/2006/main" xmlns:r="http://schemas.openxmlformats.org/officeDocument/2006/relationships" name="Office Theme">
+<a:theme xmlns:a="http://schemas.openxmlformats.org/drawingml/2006/main" name="Office Theme">
   <a:themeElements>
     <a:clrScheme name="Office">
       <a:dk1>
         <a:srgbClr val="000000"/>
       </a:dk1>
       <a:lt1>
-        <a:srgbClr val="ffffff"/>
+        <a:srgbClr val="FFFFFF"/>
       </a:lt1>
       <a:dk2>
-        <a:srgbClr val="1f497d"/>
+        <a:srgbClr val="1F497D"/>
       </a:dk2>
       <a:lt2>
-        <a:srgbClr val="eeece1"/>
+        <a:srgbClr val="EEECE1"/>
       </a:lt2>
       <a:accent1>
-        <a:srgbClr val="4f81bd"/>
+        <a:srgbClr val="4F81BD"/>
       </a:accent1>
       <a:accent2>
-        <a:srgbClr val="c0504d"/>
+        <a:srgbClr val="C0504D"/>
       </a:accent2>
       <a:accent3>
-        <a:srgbClr val="9bbb59"/>
+        <a:srgbClr val="9BBB59"/>
       </a:accent3>
       <a:accent4>
-        <a:srgbClr val="8064a2"/>
+        <a:srgbClr val="8064A2"/>
       </a:accent4>
       <a:accent5>
-        <a:srgbClr val="4bacc6"/>
+        <a:srgbClr val="4BACC6"/>
       </a:accent5>
       <a:accent6>
-        <a:srgbClr val="f79646"/>
+        <a:srgbClr val="F79646"/>
       </a:accent6>
       <a:hlink>
-        <a:srgbClr val="0000ff"/>
+        <a:srgbClr val="0000FF"/>
       </a:hlink>
       <a:folHlink>
         <a:srgbClr val="800080"/>
@@ -1443,12 +2264,12 @@
     </a:clrScheme>
     <a:fontScheme name="Office">
       <a:majorFont>
-        <a:latin typeface="Calibri" pitchFamily="0" charset="1"/>
+        <a:latin typeface="Calibri"/>
         <a:ea typeface=""/>
         <a:cs typeface=""/>
       </a:majorFont>
       <a:minorFont>
-        <a:latin typeface="Calibri" pitchFamily="0" charset="1"/>
+        <a:latin typeface="Calibri"/>
         <a:ea typeface=""/>
         <a:cs typeface=""/>
       </a:minorFont>
@@ -1477,7 +2298,7 @@
             </a:gs>
           </a:gsLst>
           <a:lin ang="16200000" scaled="1"/>
-          <a:tileRect l="0" t="0" r="0" b="0"/>
+          <a:tileRect/>
         </a:gradFill>
         <a:gradFill>
           <a:gsLst>
@@ -1495,7 +2316,7 @@
             </a:gs>
           </a:gsLst>
           <a:lin ang="16200000" scaled="0"/>
-          <a:tileRect l="0" t="0" r="0" b="0"/>
+          <a:tileRect/>
         </a:gradFill>
       </a:fillStyleLst>
       <a:lnStyleLst>
@@ -1546,7 +2367,7 @@
           <a:path path="circle">
             <a:fillToRect l="50000" t="-80000" r="50000" b="180000"/>
           </a:path>
-          <a:tileRect l="0" t="0" r="0" b="0"/>
+          <a:tileRect/>
         </a:gradFill>
         <a:gradFill>
           <a:gsLst>
@@ -1564,10 +2385,12 @@
           <a:path path="circle">
             <a:fillToRect l="50000" t="50000" r="50000" b="50000"/>
           </a:path>
-          <a:tileRect l="0" t="0" r="0" b="0"/>
+          <a:tileRect/>
         </a:gradFill>
       </a:bgFillStyleLst>
     </a:fmtScheme>
   </a:themeElements>
+  <a:objectDefaults/>
+  <a:extraClrSchemeLst/>
 </a:theme>
 </file>
</xml_diff>

<commit_message>
added the model predicted map
</commit_message>
<xml_diff>
--- a/ForestAI-Poster-PPT.pptx
+++ b/ForestAI-Poster-PPT.pptx
@@ -1620,8 +1620,8 @@
         </p:nvSpPr>
         <p:spPr>
           <a:xfrm>
-            <a:off x="7353000" y="27554900"/>
-            <a:ext cx="5054900" cy="429433"/>
+            <a:off x="8020268" y="27587852"/>
+            <a:ext cx="3404183" cy="429433"/>
           </a:xfrm>
           <a:prstGeom prst="rect">
             <a:avLst/>
@@ -1678,18 +1678,7 @@
                 <a:latin typeface="Calibri"/>
                 <a:ea typeface="PingFang SC"/>
               </a:rPr>
-              <a:t> Area of Interest for Model Training</a:t>
-            </a:r>
-            <a:r>
-              <a:rPr lang="en-US" sz="2200" b="0" i="1" u="none" strike="noStrike" dirty="0">
-                <a:solidFill>
-                  <a:schemeClr val="dk1"/>
-                </a:solidFill>
-                <a:effectLst/>
-                <a:uFillTx/>
-                <a:latin typeface="Calibri"/>
-              </a:rPr>
-              <a:t> </a:t>
+              <a:t> Variable Selection</a:t>
             </a:r>
             <a:endParaRPr lang="en-US" sz="2200" b="0" u="none" strike="noStrike" dirty="0">
               <a:solidFill>
@@ -1792,42 +1781,6 @@
           </a:p>
         </p:txBody>
       </p:sp>
-      <p:pic>
-        <p:nvPicPr>
-          <p:cNvPr id="18" name="Picture 17" descr="A map of a hurricane&#10;&#10;AI-generated content may be incorrect.">
-            <a:extLst>
-              <a:ext uri="{FF2B5EF4-FFF2-40B4-BE49-F238E27FC236}">
-                <a16:creationId xmlns:a16="http://schemas.microsoft.com/office/drawing/2014/main" id="{F61C4973-6408-2685-253B-2A7072BA11CA}"/>
-              </a:ext>
-            </a:extLst>
-          </p:cNvPr>
-          <p:cNvPicPr>
-            <a:picLocks noChangeAspect="1"/>
-          </p:cNvPicPr>
-          <p:nvPr/>
-        </p:nvPicPr>
-        <p:blipFill>
-          <a:blip r:embed="rId5">
-            <a:extLst>
-              <a:ext uri="{28A0092B-C50C-407E-A947-70E740481C1C}">
-                <a14:useLocalDpi xmlns:a14="http://schemas.microsoft.com/office/drawing/2010/main" val="0"/>
-              </a:ext>
-            </a:extLst>
-          </a:blip>
-          <a:stretch>
-            <a:fillRect/>
-          </a:stretch>
-        </p:blipFill>
-        <p:spPr>
-          <a:xfrm>
-            <a:off x="12676900" y="23670580"/>
-            <a:ext cx="8373300" cy="7449775"/>
-          </a:xfrm>
-          <a:prstGeom prst="rect">
-            <a:avLst/>
-          </a:prstGeom>
-        </p:spPr>
-      </p:pic>
       <p:sp>
         <p:nvSpPr>
           <p:cNvPr id="19" name="TextBox 13">
@@ -1957,36 +1910,6 @@
           </a:p>
         </p:txBody>
       </p:sp>
-      <p:pic>
-        <p:nvPicPr>
-          <p:cNvPr id="20" name="Picture 19">
-            <a:extLst>
-              <a:ext uri="{FF2B5EF4-FFF2-40B4-BE49-F238E27FC236}">
-                <a16:creationId xmlns:a16="http://schemas.microsoft.com/office/drawing/2014/main" id="{51080F54-6AD2-4045-3FEF-19A2EE64E84B}"/>
-              </a:ext>
-            </a:extLst>
-          </p:cNvPr>
-          <p:cNvPicPr>
-            <a:picLocks noChangeAspect="1"/>
-          </p:cNvPicPr>
-          <p:nvPr/>
-        </p:nvPicPr>
-        <p:blipFill>
-          <a:blip r:embed="rId6"/>
-          <a:stretch>
-            <a:fillRect/>
-          </a:stretch>
-        </p:blipFill>
-        <p:spPr>
-          <a:xfrm>
-            <a:off x="7914100" y="23807880"/>
-            <a:ext cx="4171835" cy="3679443"/>
-          </a:xfrm>
-          <a:prstGeom prst="rect">
-            <a:avLst/>
-          </a:prstGeom>
-        </p:spPr>
-      </p:pic>
       <p:sp>
         <p:nvSpPr>
           <p:cNvPr id="22" name="Rectangle 21">
@@ -2008,7 +1931,7 @@
             <a:avLst/>
           </a:prstGeom>
           <a:noFill/>
-          <a:ln>
+          <a:ln w="53975">
             <a:solidFill>
               <a:srgbClr val="FF0000"/>
             </a:solidFill>
@@ -2053,8 +1976,8 @@
         </p:nvSpPr>
         <p:spPr>
           <a:xfrm>
-            <a:off x="8203600" y="24000976"/>
-            <a:ext cx="3785200" cy="3177023"/>
+            <a:off x="12640799" y="23670580"/>
+            <a:ext cx="8409401" cy="7462475"/>
           </a:xfrm>
           <a:prstGeom prst="rect">
             <a:avLst/>
@@ -2107,13 +2030,13 @@
         </p:nvCxnSpPr>
         <p:spPr>
           <a:xfrm flipV="1">
-            <a:off x="4241800" y="24000976"/>
-            <a:ext cx="3961800" cy="624324"/>
+            <a:off x="4241800" y="23691478"/>
+            <a:ext cx="8399000" cy="933822"/>
           </a:xfrm>
           <a:prstGeom prst="line">
             <a:avLst/>
           </a:prstGeom>
-          <a:ln w="12700">
+          <a:ln w="50800">
             <a:solidFill>
               <a:srgbClr val="FF0000"/>
             </a:solidFill>
@@ -2151,12 +2074,12 @@
         <p:spPr>
           <a:xfrm>
             <a:off x="4241800" y="25991066"/>
-            <a:ext cx="3949700" cy="1186933"/>
+            <a:ext cx="8466740" cy="5141989"/>
           </a:xfrm>
           <a:prstGeom prst="line">
             <a:avLst/>
           </a:prstGeom>
-          <a:ln w="12700">
+          <a:ln w="50800">
             <a:solidFill>
               <a:srgbClr val="FF0000"/>
             </a:solidFill>
@@ -2192,7 +2115,7 @@
           <p:nvPr/>
         </p:nvPicPr>
         <p:blipFill>
-          <a:blip r:embed="rId7">
+          <a:blip r:embed="rId5">
             <a:extLst>
               <a:ext uri="{28A0092B-C50C-407E-A947-70E740481C1C}">
                 <a14:useLocalDpi xmlns:a14="http://schemas.microsoft.com/office/drawing/2010/main" val="0"/>
@@ -2205,8 +2128,158 @@
         </p:blipFill>
         <p:spPr>
           <a:xfrm>
-            <a:off x="7660100" y="28029324"/>
+            <a:off x="7696200" y="28047126"/>
             <a:ext cx="4489335" cy="2962854"/>
+          </a:xfrm>
+          <a:prstGeom prst="rect">
+            <a:avLst/>
+          </a:prstGeom>
+        </p:spPr>
+      </p:pic>
+      <p:pic>
+        <p:nvPicPr>
+          <p:cNvPr id="40" name="Picture 39">
+            <a:extLst>
+              <a:ext uri="{FF2B5EF4-FFF2-40B4-BE49-F238E27FC236}">
+                <a16:creationId xmlns:a16="http://schemas.microsoft.com/office/drawing/2014/main" id="{7A7713C4-2A00-4B2A-5941-AEB3D9A62DDD}"/>
+              </a:ext>
+            </a:extLst>
+          </p:cNvPr>
+          <p:cNvPicPr>
+            <a:picLocks noChangeAspect="1"/>
+          </p:cNvPicPr>
+          <p:nvPr/>
+        </p:nvPicPr>
+        <p:blipFill>
+          <a:blip r:embed="rId6"/>
+          <a:stretch>
+            <a:fillRect/>
+          </a:stretch>
+        </p:blipFill>
+        <p:spPr>
+          <a:xfrm>
+            <a:off x="7695050" y="23750615"/>
+            <a:ext cx="4444618" cy="3776640"/>
+          </a:xfrm>
+          <a:prstGeom prst="rect">
+            <a:avLst/>
+          </a:prstGeom>
+        </p:spPr>
+      </p:pic>
+      <p:sp>
+        <p:nvSpPr>
+          <p:cNvPr id="41" name="AutoShape 2">
+            <a:extLst>
+              <a:ext uri="{FF2B5EF4-FFF2-40B4-BE49-F238E27FC236}">
+                <a16:creationId xmlns:a16="http://schemas.microsoft.com/office/drawing/2014/main" id="{66AF7C68-6C59-FA55-E45B-C1E9D7A2C577}"/>
+              </a:ext>
+            </a:extLst>
+          </p:cNvPr>
+          <p:cNvSpPr>
+            <a:spLocks noChangeAspect="1" noChangeArrowheads="1"/>
+          </p:cNvSpPr>
+          <p:nvPr/>
+        </p:nvSpPr>
+        <p:spPr bwMode="auto">
+          <a:xfrm>
+            <a:off x="10820400" y="16306800"/>
+            <a:ext cx="304800" cy="304800"/>
+          </a:xfrm>
+          <a:prstGeom prst="rect">
+            <a:avLst/>
+          </a:prstGeom>
+          <a:noFill/>
+          <a:extLst>
+            <a:ext uri="{909E8E84-426E-40DD-AFC4-6F175D3DCCD1}">
+              <a14:hiddenFill xmlns:a14="http://schemas.microsoft.com/office/drawing/2010/main">
+                <a:solidFill>
+                  <a:srgbClr val="FFFFFF"/>
+                </a:solidFill>
+              </a14:hiddenFill>
+            </a:ext>
+          </a:extLst>
+        </p:spPr>
+        <p:txBody>
+          <a:bodyPr vert="horz" wrap="square" lIns="91440" tIns="45720" rIns="91440" bIns="45720" numCol="1" anchor="t" anchorCtr="0" compatLnSpc="1">
+            <a:prstTxWarp prst="textNoShape">
+              <a:avLst/>
+            </a:prstTxWarp>
+          </a:bodyPr>
+          <a:lstStyle/>
+          <a:p>
+            <a:endParaRPr lang="en-US"/>
+          </a:p>
+        </p:txBody>
+      </p:sp>
+      <p:sp>
+        <p:nvSpPr>
+          <p:cNvPr id="42" name="AutoShape 4">
+            <a:extLst>
+              <a:ext uri="{FF2B5EF4-FFF2-40B4-BE49-F238E27FC236}">
+                <a16:creationId xmlns:a16="http://schemas.microsoft.com/office/drawing/2014/main" id="{D5A0C972-DC25-B9EA-F985-FAAE3973958A}"/>
+              </a:ext>
+            </a:extLst>
+          </p:cNvPr>
+          <p:cNvSpPr>
+            <a:spLocks noChangeAspect="1" noChangeArrowheads="1"/>
+          </p:cNvSpPr>
+          <p:nvPr/>
+        </p:nvSpPr>
+        <p:spPr bwMode="auto">
+          <a:xfrm>
+            <a:off x="10972800" y="16459200"/>
+            <a:ext cx="304800" cy="304800"/>
+          </a:xfrm>
+          <a:prstGeom prst="rect">
+            <a:avLst/>
+          </a:prstGeom>
+          <a:noFill/>
+          <a:extLst>
+            <a:ext uri="{909E8E84-426E-40DD-AFC4-6F175D3DCCD1}">
+              <a14:hiddenFill xmlns:a14="http://schemas.microsoft.com/office/drawing/2010/main">
+                <a:solidFill>
+                  <a:srgbClr val="FFFFFF"/>
+                </a:solidFill>
+              </a14:hiddenFill>
+            </a:ext>
+          </a:extLst>
+        </p:spPr>
+        <p:txBody>
+          <a:bodyPr vert="horz" wrap="square" lIns="91440" tIns="45720" rIns="91440" bIns="45720" numCol="1" anchor="t" anchorCtr="0" compatLnSpc="1">
+            <a:prstTxWarp prst="textNoShape">
+              <a:avLst/>
+            </a:prstTxWarp>
+          </a:bodyPr>
+          <a:lstStyle/>
+          <a:p>
+            <a:endParaRPr lang="en-US"/>
+          </a:p>
+        </p:txBody>
+      </p:sp>
+      <p:pic>
+        <p:nvPicPr>
+          <p:cNvPr id="43" name="Picture 42">
+            <a:extLst>
+              <a:ext uri="{FF2B5EF4-FFF2-40B4-BE49-F238E27FC236}">
+                <a16:creationId xmlns:a16="http://schemas.microsoft.com/office/drawing/2014/main" id="{D7CC0DDA-5620-78A2-C2B1-8B41E078E3FB}"/>
+              </a:ext>
+            </a:extLst>
+          </p:cNvPr>
+          <p:cNvPicPr>
+            <a:picLocks noChangeAspect="1"/>
+          </p:cNvPicPr>
+          <p:nvPr/>
+        </p:nvPicPr>
+        <p:blipFill>
+          <a:blip r:embed="rId7"/>
+          <a:stretch>
+            <a:fillRect/>
+          </a:stretch>
+        </p:blipFill>
+        <p:spPr>
+          <a:xfrm>
+            <a:off x="12757219" y="23750615"/>
+            <a:ext cx="8244302" cy="7257661"/>
           </a:xfrm>
           <a:prstGeom prst="rect">
             <a:avLst/>

</xml_diff>